<commit_message>
Code Review: More motivation, note about ego
</commit_message>
<xml_diff>
--- a/Slides/Lesson 7.3 Code Reviews.pptx
+++ b/Slides/Lesson 7.3 Code Reviews.pptx
@@ -5,50 +5,52 @@
     <p:sldMasterId id="2147483648" r:id="rId1"/>
   </p:sldMasterIdLst>
   <p:notesMasterIdLst>
-    <p:notesMasterId r:id="rId18"/>
+    <p:notesMasterId r:id="rId20"/>
   </p:notesMasterIdLst>
   <p:sldIdLst>
     <p:sldId id="256" r:id="rId2"/>
     <p:sldId id="302" r:id="rId3"/>
     <p:sldId id="403" r:id="rId4"/>
-    <p:sldId id="404" r:id="rId5"/>
-    <p:sldId id="396" r:id="rId6"/>
-    <p:sldId id="397" r:id="rId7"/>
-    <p:sldId id="408" r:id="rId8"/>
-    <p:sldId id="398" r:id="rId9"/>
-    <p:sldId id="399" r:id="rId10"/>
-    <p:sldId id="405" r:id="rId11"/>
-    <p:sldId id="402" r:id="rId12"/>
-    <p:sldId id="400" r:id="rId13"/>
-    <p:sldId id="406" r:id="rId14"/>
-    <p:sldId id="407" r:id="rId15"/>
-    <p:sldId id="376" r:id="rId16"/>
-    <p:sldId id="298" r:id="rId17"/>
+    <p:sldId id="409" r:id="rId5"/>
+    <p:sldId id="404" r:id="rId6"/>
+    <p:sldId id="396" r:id="rId7"/>
+    <p:sldId id="397" r:id="rId8"/>
+    <p:sldId id="408" r:id="rId9"/>
+    <p:sldId id="398" r:id="rId10"/>
+    <p:sldId id="399" r:id="rId11"/>
+    <p:sldId id="405" r:id="rId12"/>
+    <p:sldId id="402" r:id="rId13"/>
+    <p:sldId id="400" r:id="rId14"/>
+    <p:sldId id="406" r:id="rId15"/>
+    <p:sldId id="407" r:id="rId16"/>
+    <p:sldId id="410" r:id="rId17"/>
+    <p:sldId id="376" r:id="rId18"/>
+    <p:sldId id="298" r:id="rId19"/>
   </p:sldIdLst>
   <p:sldSz cx="12192000" cy="6858000"/>
   <p:notesSz cx="6858000" cy="9144000"/>
   <p:embeddedFontLst>
     <p:embeddedFont>
       <p:font typeface="Calibri" panose="020F0502020204030204" pitchFamily="34" charset="0"/>
-      <p:regular r:id="rId19"/>
-      <p:bold r:id="rId20"/>
-      <p:italic r:id="rId21"/>
-      <p:boldItalic r:id="rId22"/>
+      <p:regular r:id="rId21"/>
+      <p:bold r:id="rId22"/>
+      <p:italic r:id="rId23"/>
+      <p:boldItalic r:id="rId24"/>
     </p:embeddedFont>
     <p:embeddedFont>
       <p:font typeface="Chalkduster" panose="03050602040202020205" pitchFamily="66" charset="77"/>
-      <p:regular r:id="rId23"/>
+      <p:regular r:id="rId25"/>
     </p:embeddedFont>
     <p:embeddedFont>
       <p:font typeface="Ink Free" panose="03080402000500000000" pitchFamily="66" charset="0"/>
-      <p:regular r:id="rId24"/>
+      <p:regular r:id="rId26"/>
     </p:embeddedFont>
     <p:embeddedFont>
       <p:font typeface="Verdana" panose="020B0604030504040204" pitchFamily="34" charset="0"/>
-      <p:regular r:id="rId25"/>
-      <p:bold r:id="rId26"/>
-      <p:italic r:id="rId27"/>
-      <p:boldItalic r:id="rId28"/>
+      <p:regular r:id="rId27"/>
+      <p:bold r:id="rId28"/>
+      <p:italic r:id="rId29"/>
+      <p:boldItalic r:id="rId30"/>
     </p:embeddedFont>
   </p:embeddedFontLst>
   <p:defaultTextStyle>
@@ -236,7 +238,7 @@
           <a:p>
             <a:fld id="{7C7E5181-6CF5-45F7-A87A-E0E0B1FD7549}" type="datetimeFigureOut">
               <a:rPr lang="en-US" smtClean="0"/>
-              <a:t>2/24/22</a:t>
+              <a:t>2/27/22</a:t>
             </a:fld>
             <a:endParaRPr lang="en-US"/>
           </a:p>
@@ -655,7 +657,7 @@
           <a:p>
             <a:fld id="{07937F07-1250-4CCE-B198-1B2887014F41}" type="slidenum">
               <a:rPr lang="en-US" smtClean="0"/>
-              <a:t>10</a:t>
+              <a:t>11</a:t>
             </a:fld>
             <a:endParaRPr lang="en-US"/>
           </a:p>
@@ -739,7 +741,7 @@
           <a:p>
             <a:fld id="{07937F07-1250-4CCE-B198-1B2887014F41}" type="slidenum">
               <a:rPr lang="en-US" smtClean="0"/>
-              <a:t>11</a:t>
+              <a:t>12</a:t>
             </a:fld>
             <a:endParaRPr lang="en-US"/>
           </a:p>
@@ -823,7 +825,7 @@
           <a:p>
             <a:fld id="{07937F07-1250-4CCE-B198-1B2887014F41}" type="slidenum">
               <a:rPr lang="en-US" smtClean="0"/>
-              <a:t>12</a:t>
+              <a:t>13</a:t>
             </a:fld>
             <a:endParaRPr lang="en-US"/>
           </a:p>
@@ -925,7 +927,7 @@
           <a:p>
             <a:fld id="{07937F07-1250-4CCE-B198-1B2887014F41}" type="slidenum">
               <a:rPr lang="en-US" smtClean="0"/>
-              <a:t>13</a:t>
+              <a:t>14</a:t>
             </a:fld>
             <a:endParaRPr lang="en-US"/>
           </a:p>
@@ -1012,7 +1014,7 @@
           <a:p>
             <a:fld id="{07937F07-1250-4CCE-B198-1B2887014F41}" type="slidenum">
               <a:rPr lang="en-US" smtClean="0"/>
-              <a:t>14</a:t>
+              <a:t>15</a:t>
             </a:fld>
             <a:endParaRPr lang="en-US"/>
           </a:p>
@@ -1096,7 +1098,7 @@
           <a:p>
             <a:fld id="{07937F07-1250-4CCE-B198-1B2887014F41}" type="slidenum">
               <a:rPr lang="en-US" smtClean="0"/>
-              <a:t>15</a:t>
+              <a:t>16</a:t>
             </a:fld>
             <a:endParaRPr lang="en-US"/>
           </a:p>
@@ -1105,7 +1107,7 @@
     </p:spTree>
     <p:extLst>
       <p:ext uri="{BB962C8B-B14F-4D97-AF65-F5344CB8AC3E}">
-        <p14:creationId xmlns:p14="http://schemas.microsoft.com/office/powerpoint/2010/main" val="329564543"/>
+        <p14:creationId xmlns:p14="http://schemas.microsoft.com/office/powerpoint/2010/main" val="2499709901"/>
       </p:ext>
     </p:extLst>
   </p:cSld>
@@ -1180,7 +1182,91 @@
           <a:p>
             <a:fld id="{07937F07-1250-4CCE-B198-1B2887014F41}" type="slidenum">
               <a:rPr lang="en-US" smtClean="0"/>
-              <a:t>16</a:t>
+              <a:t>17</a:t>
+            </a:fld>
+            <a:endParaRPr lang="en-US"/>
+          </a:p>
+        </p:txBody>
+      </p:sp>
+    </p:spTree>
+    <p:extLst>
+      <p:ext uri="{BB962C8B-B14F-4D97-AF65-F5344CB8AC3E}">
+        <p14:creationId xmlns:p14="http://schemas.microsoft.com/office/powerpoint/2010/main" val="329564543"/>
+      </p:ext>
+    </p:extLst>
+  </p:cSld>
+  <p:clrMapOvr>
+    <a:masterClrMapping/>
+  </p:clrMapOvr>
+</p:notes>
+</file>
+
+<file path=ppt/notesSlides/notesSlide17.xml><?xml version="1.0" encoding="utf-8"?>
+<p:notes xmlns:a="http://schemas.openxmlformats.org/drawingml/2006/main" xmlns:r="http://schemas.openxmlformats.org/officeDocument/2006/relationships" xmlns:p="http://schemas.openxmlformats.org/presentationml/2006/main">
+  <p:cSld>
+    <p:spTree>
+      <p:nvGrpSpPr>
+        <p:cNvPr id="1" name=""/>
+        <p:cNvGrpSpPr/>
+        <p:nvPr/>
+      </p:nvGrpSpPr>
+      <p:grpSpPr>
+        <a:xfrm>
+          <a:off x="0" y="0"/>
+          <a:ext cx="0" cy="0"/>
+          <a:chOff x="0" y="0"/>
+          <a:chExt cx="0" cy="0"/>
+        </a:xfrm>
+      </p:grpSpPr>
+      <p:sp>
+        <p:nvSpPr>
+          <p:cNvPr id="2" name="Slide Image Placeholder 1"/>
+          <p:cNvSpPr>
+            <a:spLocks noGrp="1" noRot="1" noChangeAspect="1"/>
+          </p:cNvSpPr>
+          <p:nvPr>
+            <p:ph type="sldImg"/>
+          </p:nvPr>
+        </p:nvSpPr>
+        <p:spPr/>
+      </p:sp>
+      <p:sp>
+        <p:nvSpPr>
+          <p:cNvPr id="3" name="Notes Placeholder 2"/>
+          <p:cNvSpPr>
+            <a:spLocks noGrp="1"/>
+          </p:cNvSpPr>
+          <p:nvPr>
+            <p:ph type="body" idx="1"/>
+          </p:nvPr>
+        </p:nvSpPr>
+        <p:spPr/>
+        <p:txBody>
+          <a:bodyPr/>
+          <a:lstStyle/>
+          <a:p>
+            <a:endParaRPr lang="en-US"/>
+          </a:p>
+        </p:txBody>
+      </p:sp>
+      <p:sp>
+        <p:nvSpPr>
+          <p:cNvPr id="4" name="Slide Number Placeholder 3"/>
+          <p:cNvSpPr>
+            <a:spLocks noGrp="1"/>
+          </p:cNvSpPr>
+          <p:nvPr>
+            <p:ph type="sldNum" sz="quarter" idx="5"/>
+          </p:nvPr>
+        </p:nvSpPr>
+        <p:spPr/>
+        <p:txBody>
+          <a:bodyPr/>
+          <a:lstStyle/>
+          <a:p>
+            <a:fld id="{07937F07-1250-4CCE-B198-1B2887014F41}" type="slidenum">
+              <a:rPr lang="en-US" smtClean="0"/>
+              <a:t>18</a:t>
             </a:fld>
             <a:endParaRPr lang="en-US"/>
           </a:p>
@@ -1327,7 +1413,7 @@
           <a:bodyPr/>
           <a:lstStyle/>
           <a:p>
-            <a:endParaRPr lang="en-US"/>
+            <a:endParaRPr lang="en-US" dirty="0"/>
           </a:p>
         </p:txBody>
       </p:sp>
@@ -1411,7 +1497,11 @@
           <a:bodyPr/>
           <a:lstStyle/>
           <a:p>
-            <a:endParaRPr lang="en-US" dirty="0"/>
+            <a:pPr algn="l"/>
+            <a:r>
+              <a:rPr lang="en-US" dirty="0"/>
+              <a:t>A formal code inspection is a heavyweight process, usually called for by strict standards and there’s a detailed paper trail to be produced.</a:t>
+            </a:r>
           </a:p>
         </p:txBody>
       </p:sp>
@@ -1432,7 +1522,7 @@
           <a:p>
             <a:fld id="{07937F07-1250-4CCE-B198-1B2887014F41}" type="slidenum">
               <a:rPr lang="en-US" smtClean="0"/>
-              <a:t>4</a:t>
+              <a:t>5</a:t>
             </a:fld>
             <a:endParaRPr lang="en-US"/>
           </a:p>
@@ -1516,7 +1606,7 @@
           <a:p>
             <a:fld id="{07937F07-1250-4CCE-B198-1B2887014F41}" type="slidenum">
               <a:rPr lang="en-US" smtClean="0"/>
-              <a:t>5</a:t>
+              <a:t>6</a:t>
             </a:fld>
             <a:endParaRPr lang="en-US"/>
           </a:p>
@@ -1600,7 +1690,7 @@
           <a:p>
             <a:fld id="{07937F07-1250-4CCE-B198-1B2887014F41}" type="slidenum">
               <a:rPr lang="en-US" smtClean="0"/>
-              <a:t>6</a:t>
+              <a:t>7</a:t>
             </a:fld>
             <a:endParaRPr lang="en-US"/>
           </a:p>
@@ -1687,7 +1777,7 @@
           <a:p>
             <a:fld id="{07937F07-1250-4CCE-B198-1B2887014F41}" type="slidenum">
               <a:rPr lang="en-US" smtClean="0"/>
-              <a:t>7</a:t>
+              <a:t>8</a:t>
             </a:fld>
             <a:endParaRPr lang="en-US"/>
           </a:p>
@@ -1771,7 +1861,7 @@
           <a:p>
             <a:fld id="{07937F07-1250-4CCE-B198-1B2887014F41}" type="slidenum">
               <a:rPr lang="en-US" smtClean="0"/>
-              <a:t>8</a:t>
+              <a:t>9</a:t>
             </a:fld>
             <a:endParaRPr lang="en-US"/>
           </a:p>
@@ -1855,7 +1945,7 @@
           <a:p>
             <a:fld id="{07937F07-1250-4CCE-B198-1B2887014F41}" type="slidenum">
               <a:rPr lang="en-US" smtClean="0"/>
-              <a:t>9</a:t>
+              <a:t>10</a:t>
             </a:fld>
             <a:endParaRPr lang="en-US"/>
           </a:p>
@@ -2030,7 +2120,7 @@
           <a:p>
             <a:fld id="{5D2A64DE-480B-420F-9649-4F8E696E08E0}" type="datetime1">
               <a:rPr lang="en-US" smtClean="0"/>
-              <a:t>2/24/22</a:t>
+              <a:t>2/27/22</a:t>
             </a:fld>
             <a:endParaRPr lang="en-US"/>
           </a:p>
@@ -2264,7 +2354,7 @@
           <a:p>
             <a:fld id="{0D3616D0-8311-4107-9726-6B805E7D05BA}" type="datetime1">
               <a:rPr lang="en-US" smtClean="0"/>
-              <a:t>2/24/22</a:t>
+              <a:t>2/27/22</a:t>
             </a:fld>
             <a:endParaRPr lang="en-US"/>
           </a:p>
@@ -2472,7 +2562,7 @@
           <a:p>
             <a:fld id="{3BC2557A-5C88-417A-A763-5AC779462A5F}" type="datetime1">
               <a:rPr lang="en-US" smtClean="0"/>
-              <a:t>2/24/22</a:t>
+              <a:t>2/27/22</a:t>
             </a:fld>
             <a:endParaRPr lang="en-US"/>
           </a:p>
@@ -3002,7 +3092,7 @@
           <a:p>
             <a:fld id="{07C7BFD4-467E-4EDE-93EA-052F5B39A4E5}" type="datetime1">
               <a:rPr lang="en-US" smtClean="0"/>
-              <a:t>2/24/22</a:t>
+              <a:t>2/27/22</a:t>
             </a:fld>
             <a:endParaRPr lang="en-US"/>
           </a:p>
@@ -3316,7 +3406,7 @@
           <a:p>
             <a:fld id="{A533CBE2-D5BE-47AC-ADC2-9CDFC1D0CF90}" type="datetime1">
               <a:rPr lang="en-US" smtClean="0"/>
-              <a:t>2/24/22</a:t>
+              <a:t>2/27/22</a:t>
             </a:fld>
             <a:endParaRPr lang="en-US"/>
           </a:p>
@@ -3619,7 +3709,7 @@
           <a:p>
             <a:fld id="{39B7EDB1-CE74-4951-85A2-0B01C2128E28}" type="datetime1">
               <a:rPr lang="en-US" smtClean="0"/>
-              <a:t>2/24/22</a:t>
+              <a:t>2/27/22</a:t>
             </a:fld>
             <a:endParaRPr lang="en-US"/>
           </a:p>
@@ -4068,7 +4158,7 @@
           <a:p>
             <a:fld id="{2BC7EB92-A5C2-4807-A9DC-9EDE6CBFB241}" type="datetime1">
               <a:rPr lang="en-US" smtClean="0"/>
-              <a:t>2/24/22</a:t>
+              <a:t>2/27/22</a:t>
             </a:fld>
             <a:endParaRPr lang="en-US"/>
           </a:p>
@@ -4215,7 +4305,7 @@
           <a:p>
             <a:fld id="{109E55A0-C911-4F03-82FC-7E5926047D46}" type="datetime1">
               <a:rPr lang="en-US" smtClean="0"/>
-              <a:t>2/24/22</a:t>
+              <a:t>2/27/22</a:t>
             </a:fld>
             <a:endParaRPr lang="en-US"/>
           </a:p>
@@ -4364,7 +4454,7 @@
           <a:p>
             <a:fld id="{2B7B7EE0-7771-4CD5-9B2B-3550753A54A1}" type="datetime1">
               <a:rPr lang="en-US" smtClean="0"/>
-              <a:t>2/24/22</a:t>
+              <a:t>2/27/22</a:t>
             </a:fld>
             <a:endParaRPr lang="en-US"/>
           </a:p>
@@ -4675,7 +4765,7 @@
           <a:p>
             <a:fld id="{F8B318B3-0E87-4416-A9B8-D891968C2727}" type="datetime1">
               <a:rPr lang="en-US" smtClean="0"/>
-              <a:t>2/24/22</a:t>
+              <a:t>2/27/22</a:t>
             </a:fld>
             <a:endParaRPr lang="en-US"/>
           </a:p>
@@ -4966,7 +5056,7 @@
           <a:p>
             <a:fld id="{EA476A42-A091-4468-A075-64A31BE59948}" type="datetime1">
               <a:rPr lang="en-US" smtClean="0"/>
-              <a:t>2/24/22</a:t>
+              <a:t>2/27/22</a:t>
             </a:fld>
             <a:endParaRPr lang="en-US"/>
           </a:p>
@@ -5209,7 +5299,7 @@
           <a:p>
             <a:fld id="{54D997E8-DDEE-43F1-8D9B-F8A1E11DE488}" type="datetime1">
               <a:rPr lang="en-US" smtClean="0"/>
-              <a:t>2/24/22</a:t>
+              <a:t>2/27/22</a:t>
             </a:fld>
             <a:endParaRPr lang="en-US"/>
           </a:p>
@@ -5897,8 +5987,97 @@
           <a:p>
             <a:r>
               <a:rPr lang="en-US" dirty="0"/>
-              <a:t>Code Review: Example on Pull Request</a:t>
-            </a:r>
+              <a:t>Code Review: How</a:t>
+            </a:r>
+          </a:p>
+        </p:txBody>
+      </p:sp>
+      <p:sp>
+        <p:nvSpPr>
+          <p:cNvPr id="3" name="Content Placeholder 2">
+            <a:extLst>
+              <a:ext uri="{FF2B5EF4-FFF2-40B4-BE49-F238E27FC236}">
+                <a16:creationId xmlns:a16="http://schemas.microsoft.com/office/drawing/2014/main" id="{9C97AA96-EA46-EB42-B5D4-4EC75011D27A}"/>
+              </a:ext>
+            </a:extLst>
+          </p:cNvPr>
+          <p:cNvSpPr>
+            <a:spLocks noGrp="1"/>
+          </p:cNvSpPr>
+          <p:nvPr>
+            <p:ph idx="1"/>
+          </p:nvPr>
+        </p:nvSpPr>
+        <p:spPr/>
+        <p:txBody>
+          <a:bodyPr>
+            <a:normAutofit lnSpcReduction="10000"/>
+          </a:bodyPr>
+          <a:lstStyle/>
+          <a:p>
+            <a:r>
+              <a:rPr lang="en-US" dirty="0"/>
+              <a:t>At Google, reviewers get access to changes, explanation and all relevant test results: review is asynchronous.</a:t>
+            </a:r>
+          </a:p>
+          <a:p>
+            <a:r>
+              <a:rPr lang="en-US" dirty="0"/>
+              <a:t>Elsewhere reviews can be in person:</a:t>
+            </a:r>
+          </a:p>
+          <a:p>
+            <a:pPr lvl="1"/>
+            <a:r>
+              <a:rPr lang="en-US" dirty="0"/>
+              <a:t>More heavyweight, cannot be as common.</a:t>
+            </a:r>
+          </a:p>
+          <a:p>
+            <a:r>
+              <a:rPr lang="en-US" dirty="0"/>
+              <a:t>Review must be professional and impersonal:</a:t>
+            </a:r>
+          </a:p>
+          <a:p>
+            <a:pPr lvl="1"/>
+            <a:r>
+              <a:rPr lang="en-US" dirty="0"/>
+              <a:t>No one is being “attacked” (or, no one </a:t>
+            </a:r>
+            <a:r>
+              <a:rPr lang="en-US" i="1" dirty="0"/>
+              <a:t>should </a:t>
+            </a:r>
+            <a:r>
+              <a:rPr lang="en-US" dirty="0"/>
+              <a:t>be).</a:t>
+            </a:r>
+          </a:p>
+          <a:p>
+            <a:r>
+              <a:rPr lang="en-US" dirty="0"/>
+              <a:t>Don’t rehash design arguments (defer to author).</a:t>
+            </a:r>
+          </a:p>
+          <a:p>
+            <a:r>
+              <a:rPr lang="en-US" dirty="0"/>
+              <a:t>All suggestions and criticisms must be addressed:</a:t>
+            </a:r>
+          </a:p>
+          <a:p>
+            <a:pPr lvl="1"/>
+            <a:r>
+              <a:rPr lang="en-US" dirty="0"/>
+              <a:t>At least in the negative.</a:t>
+            </a:r>
+          </a:p>
+          <a:p>
+            <a:endParaRPr lang="en-US" dirty="0"/>
+          </a:p>
+          <a:p>
+            <a:endParaRPr lang="en-US" dirty="0"/>
           </a:p>
         </p:txBody>
       </p:sp>
@@ -5926,6 +6105,93 @@
             <a:fld id="{20F37917-FD3A-4669-9018-DA04BCDD3D75}" type="slidenum">
               <a:rPr lang="en-US" smtClean="0"/>
               <a:t>10</a:t>
+            </a:fld>
+            <a:endParaRPr lang="en-US"/>
+          </a:p>
+        </p:txBody>
+      </p:sp>
+    </p:spTree>
+    <p:extLst>
+      <p:ext uri="{BB962C8B-B14F-4D97-AF65-F5344CB8AC3E}">
+        <p14:creationId xmlns:p14="http://schemas.microsoft.com/office/powerpoint/2010/main" val="3188636758"/>
+      </p:ext>
+    </p:extLst>
+  </p:cSld>
+  <p:clrMapOvr>
+    <a:masterClrMapping/>
+  </p:clrMapOvr>
+</p:sld>
+</file>
+
+<file path=ppt/slides/slide11.xml><?xml version="1.0" encoding="utf-8"?>
+<p:sld xmlns:a="http://schemas.openxmlformats.org/drawingml/2006/main" xmlns:r="http://schemas.openxmlformats.org/officeDocument/2006/relationships" xmlns:p="http://schemas.openxmlformats.org/presentationml/2006/main">
+  <p:cSld>
+    <p:spTree>
+      <p:nvGrpSpPr>
+        <p:cNvPr id="1" name=""/>
+        <p:cNvGrpSpPr/>
+        <p:nvPr/>
+      </p:nvGrpSpPr>
+      <p:grpSpPr>
+        <a:xfrm>
+          <a:off x="0" y="0"/>
+          <a:ext cx="0" cy="0"/>
+          <a:chOff x="0" y="0"/>
+          <a:chExt cx="0" cy="0"/>
+        </a:xfrm>
+      </p:grpSpPr>
+      <p:sp>
+        <p:nvSpPr>
+          <p:cNvPr id="2" name="Title 1">
+            <a:extLst>
+              <a:ext uri="{FF2B5EF4-FFF2-40B4-BE49-F238E27FC236}">
+                <a16:creationId xmlns:a16="http://schemas.microsoft.com/office/drawing/2014/main" id="{13DDED77-BDAF-DF49-A50C-A32154CFC81D}"/>
+              </a:ext>
+            </a:extLst>
+          </p:cNvPr>
+          <p:cNvSpPr>
+            <a:spLocks noGrp="1"/>
+          </p:cNvSpPr>
+          <p:nvPr>
+            <p:ph type="title"/>
+          </p:nvPr>
+        </p:nvSpPr>
+        <p:spPr/>
+        <p:txBody>
+          <a:bodyPr/>
+          <a:lstStyle/>
+          <a:p>
+            <a:r>
+              <a:rPr lang="en-US" dirty="0"/>
+              <a:t>Code Review: Example on Pull Request</a:t>
+            </a:r>
+          </a:p>
+        </p:txBody>
+      </p:sp>
+      <p:sp>
+        <p:nvSpPr>
+          <p:cNvPr id="4" name="Slide Number Placeholder 3">
+            <a:extLst>
+              <a:ext uri="{FF2B5EF4-FFF2-40B4-BE49-F238E27FC236}">
+                <a16:creationId xmlns:a16="http://schemas.microsoft.com/office/drawing/2014/main" id="{77118D72-73C8-4743-9D00-CE096A77A867}"/>
+              </a:ext>
+            </a:extLst>
+          </p:cNvPr>
+          <p:cNvSpPr>
+            <a:spLocks noGrp="1"/>
+          </p:cNvSpPr>
+          <p:nvPr>
+            <p:ph type="sldNum" sz="quarter" idx="12"/>
+          </p:nvPr>
+        </p:nvSpPr>
+        <p:spPr/>
+        <p:txBody>
+          <a:bodyPr/>
+          <a:lstStyle/>
+          <a:p>
+            <a:fld id="{20F37917-FD3A-4669-9018-DA04BCDD3D75}" type="slidenum">
+              <a:rPr lang="en-US" smtClean="0"/>
+              <a:t>11</a:t>
             </a:fld>
             <a:endParaRPr lang="en-US"/>
           </a:p>
@@ -6002,159 +6268,6 @@
 </p:sld>
 </file>
 
-<file path=ppt/slides/slide11.xml><?xml version="1.0" encoding="utf-8"?>
-<p:sld xmlns:a="http://schemas.openxmlformats.org/drawingml/2006/main" xmlns:r="http://schemas.openxmlformats.org/officeDocument/2006/relationships" xmlns:p="http://schemas.openxmlformats.org/presentationml/2006/main">
-  <p:cSld>
-    <p:spTree>
-      <p:nvGrpSpPr>
-        <p:cNvPr id="1" name=""/>
-        <p:cNvGrpSpPr/>
-        <p:nvPr/>
-      </p:nvGrpSpPr>
-      <p:grpSpPr>
-        <a:xfrm>
-          <a:off x="0" y="0"/>
-          <a:ext cx="0" cy="0"/>
-          <a:chOff x="0" y="0"/>
-          <a:chExt cx="0" cy="0"/>
-        </a:xfrm>
-      </p:grpSpPr>
-      <p:sp>
-        <p:nvSpPr>
-          <p:cNvPr id="2" name="Title 1">
-            <a:extLst>
-              <a:ext uri="{FF2B5EF4-FFF2-40B4-BE49-F238E27FC236}">
-                <a16:creationId xmlns:a16="http://schemas.microsoft.com/office/drawing/2014/main" id="{E4619150-2328-3E4C-9972-115212E34C5C}"/>
-              </a:ext>
-            </a:extLst>
-          </p:cNvPr>
-          <p:cNvSpPr>
-            <a:spLocks noGrp="1"/>
-          </p:cNvSpPr>
-          <p:nvPr>
-            <p:ph type="title"/>
-          </p:nvPr>
-        </p:nvSpPr>
-        <p:spPr/>
-        <p:txBody>
-          <a:bodyPr/>
-          <a:lstStyle/>
-          <a:p>
-            <a:r>
-              <a:rPr lang="en-US" dirty="0"/>
-              <a:t>Code Review: Sample Check-List</a:t>
-            </a:r>
-          </a:p>
-        </p:txBody>
-      </p:sp>
-      <p:sp>
-        <p:nvSpPr>
-          <p:cNvPr id="3" name="Content Placeholder 2">
-            <a:extLst>
-              <a:ext uri="{FF2B5EF4-FFF2-40B4-BE49-F238E27FC236}">
-                <a16:creationId xmlns:a16="http://schemas.microsoft.com/office/drawing/2014/main" id="{C741FA36-EDEF-8B48-BFE3-BFDAE5786274}"/>
-              </a:ext>
-            </a:extLst>
-          </p:cNvPr>
-          <p:cNvSpPr>
-            <a:spLocks noGrp="1"/>
-          </p:cNvSpPr>
-          <p:nvPr>
-            <p:ph idx="1"/>
-          </p:nvPr>
-        </p:nvSpPr>
-        <p:spPr/>
-        <p:txBody>
-          <a:bodyPr>
-            <a:normAutofit/>
-          </a:bodyPr>
-          <a:lstStyle/>
-          <a:p>
-            <a:r>
-              <a:rPr lang="en-US" dirty="0"/>
-              <a:t>Am I able to understand the code easily?</a:t>
-            </a:r>
-          </a:p>
-          <a:p>
-            <a:r>
-              <a:rPr lang="en-US" dirty="0"/>
-              <a:t>Does the code follow our style guidelines?</a:t>
-            </a:r>
-          </a:p>
-          <a:p>
-            <a:r>
-              <a:rPr lang="en-US" dirty="0"/>
-              <a:t>Is the same code duplicated more than once?</a:t>
-            </a:r>
-          </a:p>
-          <a:p>
-            <a:r>
-              <a:rPr lang="en-US" dirty="0"/>
-              <a:t>Is this file (or change) too big?</a:t>
-            </a:r>
-          </a:p>
-          <a:p>
-            <a:r>
-              <a:rPr lang="en-US" dirty="0"/>
-              <a:t>Does this code meet our non-functional requirements?</a:t>
-            </a:r>
-          </a:p>
-          <a:p>
-            <a:r>
-              <a:rPr lang="en-US" dirty="0"/>
-              <a:t>Is this code maintainable?</a:t>
-            </a:r>
-          </a:p>
-          <a:p>
-            <a:r>
-              <a:rPr lang="en-US" dirty="0"/>
-              <a:t>Does this code have unintended side-effects?</a:t>
-            </a:r>
-          </a:p>
-        </p:txBody>
-      </p:sp>
-      <p:sp>
-        <p:nvSpPr>
-          <p:cNvPr id="4" name="Slide Number Placeholder 3">
-            <a:extLst>
-              <a:ext uri="{FF2B5EF4-FFF2-40B4-BE49-F238E27FC236}">
-                <a16:creationId xmlns:a16="http://schemas.microsoft.com/office/drawing/2014/main" id="{C07539C3-F643-BC42-9FD7-CD8C83CC9717}"/>
-              </a:ext>
-            </a:extLst>
-          </p:cNvPr>
-          <p:cNvSpPr>
-            <a:spLocks noGrp="1"/>
-          </p:cNvSpPr>
-          <p:nvPr>
-            <p:ph type="sldNum" sz="quarter" idx="12"/>
-          </p:nvPr>
-        </p:nvSpPr>
-        <p:spPr/>
-        <p:txBody>
-          <a:bodyPr/>
-          <a:lstStyle/>
-          <a:p>
-            <a:fld id="{20F37917-FD3A-4669-9018-DA04BCDD3D75}" type="slidenum">
-              <a:rPr lang="en-US" smtClean="0"/>
-              <a:t>11</a:t>
-            </a:fld>
-            <a:endParaRPr lang="en-US"/>
-          </a:p>
-        </p:txBody>
-      </p:sp>
-    </p:spTree>
-    <p:extLst>
-      <p:ext uri="{BB962C8B-B14F-4D97-AF65-F5344CB8AC3E}">
-        <p14:creationId xmlns:p14="http://schemas.microsoft.com/office/powerpoint/2010/main" val="566557662"/>
-      </p:ext>
-    </p:extLst>
-  </p:cSld>
-  <p:clrMapOvr>
-    <a:masterClrMapping/>
-  </p:clrMapOvr>
-</p:sld>
-</file>
-
 <file path=ppt/slides/slide12.xml><?xml version="1.0" encoding="utf-8"?>
 <p:sld xmlns:a="http://schemas.openxmlformats.org/drawingml/2006/main" xmlns:r="http://schemas.openxmlformats.org/officeDocument/2006/relationships" xmlns:p="http://schemas.openxmlformats.org/presentationml/2006/main">
   <p:cSld>
@@ -6177,7 +6290,7 @@
           <p:cNvPr id="2" name="Title 1">
             <a:extLst>
               <a:ext uri="{FF2B5EF4-FFF2-40B4-BE49-F238E27FC236}">
-                <a16:creationId xmlns:a16="http://schemas.microsoft.com/office/drawing/2014/main" id="{188DC642-3277-0841-A823-BC61351EFB71}"/>
+                <a16:creationId xmlns:a16="http://schemas.microsoft.com/office/drawing/2014/main" id="{E4619150-2328-3E4C-9972-115212E34C5C}"/>
               </a:ext>
             </a:extLst>
           </p:cNvPr>
@@ -6195,7 +6308,7 @@
           <a:p>
             <a:r>
               <a:rPr lang="en-US" dirty="0"/>
-              <a:t>Code Review: Why</a:t>
+              <a:t>Code Review: Sample Check-List</a:t>
             </a:r>
           </a:p>
         </p:txBody>
@@ -6205,7 +6318,7 @@
           <p:cNvPr id="3" name="Content Placeholder 2">
             <a:extLst>
               <a:ext uri="{FF2B5EF4-FFF2-40B4-BE49-F238E27FC236}">
-                <a16:creationId xmlns:a16="http://schemas.microsoft.com/office/drawing/2014/main" id="{702FC2F8-62E6-4845-915D-D1A335608C7D}"/>
+                <a16:creationId xmlns:a16="http://schemas.microsoft.com/office/drawing/2014/main" id="{C741FA36-EDEF-8B48-BFE3-BFDAE5786274}"/>
               </a:ext>
             </a:extLst>
           </p:cNvPr>
@@ -6218,56 +6331,51 @@
         </p:nvSpPr>
         <p:spPr/>
         <p:txBody>
-          <a:bodyPr/>
-          <a:lstStyle/>
-          <a:p>
-            <a:r>
-              <a:rPr lang="en-US" dirty="0"/>
-              <a:t>Code review increases breadth of knowledge of code:</a:t>
-            </a:r>
-          </a:p>
-          <a:p>
-            <a:pPr lvl="1"/>
-            <a:r>
-              <a:rPr lang="en-US" dirty="0"/>
-              <a:t>Other people ”know” the code;</a:t>
-            </a:r>
-          </a:p>
-          <a:p>
-            <a:pPr lvl="1"/>
-            <a:r>
-              <a:rPr lang="en-US" dirty="0"/>
-              <a:t>Easier to handle someone cycling off project.</a:t>
-            </a:r>
-          </a:p>
-          <a:p>
-            <a:r>
-              <a:rPr lang="en-US" dirty="0"/>
-              <a:t>Verbalizing decisions improves their quality:</a:t>
-            </a:r>
-          </a:p>
-          <a:p>
-            <a:pPr lvl="1"/>
-            <a:r>
-              <a:rPr lang="en-US" dirty="0"/>
-              <a:t>The process of writing an explanation encourages critical thinking.</a:t>
-            </a:r>
-          </a:p>
-          <a:p>
-            <a:r>
-              <a:rPr lang="en-US" dirty="0"/>
-              <a:t>Code reviews improve quality of code base:</a:t>
-            </a:r>
-          </a:p>
-          <a:p>
-            <a:pPr lvl="1"/>
-            <a:r>
-              <a:rPr lang="en-US" dirty="0"/>
-              <a:t>Knowing code will be reviewed pushes developers to make code more presentable and understandable.</a:t>
-            </a:r>
-          </a:p>
-          <a:p>
-            <a:endParaRPr lang="en-US" dirty="0"/>
+          <a:bodyPr>
+            <a:normAutofit/>
+          </a:bodyPr>
+          <a:lstStyle/>
+          <a:p>
+            <a:r>
+              <a:rPr lang="en-US" dirty="0"/>
+              <a:t>Am I able to understand the code easily?</a:t>
+            </a:r>
+          </a:p>
+          <a:p>
+            <a:r>
+              <a:rPr lang="en-US" dirty="0"/>
+              <a:t>Does the code follow our style guidelines?</a:t>
+            </a:r>
+          </a:p>
+          <a:p>
+            <a:r>
+              <a:rPr lang="en-US" dirty="0"/>
+              <a:t>Is the same code duplicated more than once?</a:t>
+            </a:r>
+          </a:p>
+          <a:p>
+            <a:r>
+              <a:rPr lang="en-US" dirty="0"/>
+              <a:t>Is this file (or change) too big?</a:t>
+            </a:r>
+          </a:p>
+          <a:p>
+            <a:r>
+              <a:rPr lang="en-US" dirty="0"/>
+              <a:t>Does this code meet our non-functional requirements?</a:t>
+            </a:r>
+          </a:p>
+          <a:p>
+            <a:r>
+              <a:rPr lang="en-US" dirty="0"/>
+              <a:t>Is this code maintainable?</a:t>
+            </a:r>
+          </a:p>
+          <a:p>
+            <a:r>
+              <a:rPr lang="en-US" dirty="0"/>
+              <a:t>Does this code have unintended side-effects?</a:t>
+            </a:r>
           </a:p>
         </p:txBody>
       </p:sp>
@@ -6276,7 +6384,7 @@
           <p:cNvPr id="4" name="Slide Number Placeholder 3">
             <a:extLst>
               <a:ext uri="{FF2B5EF4-FFF2-40B4-BE49-F238E27FC236}">
-                <a16:creationId xmlns:a16="http://schemas.microsoft.com/office/drawing/2014/main" id="{255FE36A-883B-0148-8025-988C8F4EEBD1}"/>
+                <a16:creationId xmlns:a16="http://schemas.microsoft.com/office/drawing/2014/main" id="{C07539C3-F643-BC42-9FD7-CD8C83CC9717}"/>
               </a:ext>
             </a:extLst>
           </p:cNvPr>
@@ -6303,7 +6411,7 @@
     </p:spTree>
     <p:extLst>
       <p:ext uri="{BB962C8B-B14F-4D97-AF65-F5344CB8AC3E}">
-        <p14:creationId xmlns:p14="http://schemas.microsoft.com/office/powerpoint/2010/main" val="1361732932"/>
+        <p14:creationId xmlns:p14="http://schemas.microsoft.com/office/powerpoint/2010/main" val="566557662"/>
       </p:ext>
     </p:extLst>
   </p:cSld>
@@ -6353,7 +6461,7 @@
           <a:p>
             <a:r>
               <a:rPr lang="en-US" dirty="0"/>
-              <a:t>Code Review: Why (Google)</a:t>
+              <a:t>Code Review: Why</a:t>
             </a:r>
           </a:p>
         </p:txBody>
@@ -6374,23 +6482,58 @@
             <p:ph idx="1"/>
           </p:nvPr>
         </p:nvSpPr>
-        <p:spPr>
-          <a:xfrm>
-            <a:off x="838200" y="1500160"/>
-            <a:ext cx="10646664" cy="4351338"/>
-          </a:xfrm>
-        </p:spPr>
-        <p:txBody>
-          <a:bodyPr/>
-          <a:lstStyle/>
-          <a:p>
-            <a:pPr marL="0" indent="0">
-              <a:buNone/>
-            </a:pPr>
-            <a:r>
-              <a:rPr lang="en-US" dirty="0"/>
-              <a:t>Different team members have different motivations and bring different benefits</a:t>
-            </a:r>
+        <p:spPr/>
+        <p:txBody>
+          <a:bodyPr/>
+          <a:lstStyle/>
+          <a:p>
+            <a:r>
+              <a:rPr lang="en-US" dirty="0"/>
+              <a:t>Code review increases breadth of knowledge of code:</a:t>
+            </a:r>
+          </a:p>
+          <a:p>
+            <a:pPr lvl="1"/>
+            <a:r>
+              <a:rPr lang="en-US" dirty="0"/>
+              <a:t>Other people ”know” the code;</a:t>
+            </a:r>
+          </a:p>
+          <a:p>
+            <a:pPr lvl="1"/>
+            <a:r>
+              <a:rPr lang="en-US" dirty="0"/>
+              <a:t>Easier to handle someone cycling off project.</a:t>
+            </a:r>
+          </a:p>
+          <a:p>
+            <a:r>
+              <a:rPr lang="en-US" dirty="0"/>
+              <a:t>Verbalizing decisions improves their quality:</a:t>
+            </a:r>
+          </a:p>
+          <a:p>
+            <a:pPr lvl="1"/>
+            <a:r>
+              <a:rPr lang="en-US" dirty="0"/>
+              <a:t>The process of writing an explanation encourages critical thinking.</a:t>
+            </a:r>
+          </a:p>
+          <a:p>
+            <a:r>
+              <a:rPr lang="en-US" dirty="0"/>
+              <a:t>Code reviews improve quality of code base:</a:t>
+            </a:r>
+          </a:p>
+          <a:p>
+            <a:pPr lvl="1"/>
+            <a:r>
+              <a:rPr lang="en-US" dirty="0"/>
+              <a:t>Knowing code will be reviewed pushes developers to make code more presentable and understandable.</a:t>
+            </a:r>
+          </a:p>
+          <a:p>
+            <a:endParaRPr lang="en-US" dirty="0"/>
           </a:p>
         </p:txBody>
       </p:sp>
@@ -6423,89 +6566,10 @@
           </a:p>
         </p:txBody>
       </p:sp>
-      <p:pic>
-        <p:nvPicPr>
-          <p:cNvPr id="5" name="Image" descr="Image">
-            <a:extLst>
-              <a:ext uri="{FF2B5EF4-FFF2-40B4-BE49-F238E27FC236}">
-                <a16:creationId xmlns:a16="http://schemas.microsoft.com/office/drawing/2014/main" id="{89BA6630-94A4-8442-A17A-5FEDA134E234}"/>
-              </a:ext>
-            </a:extLst>
-          </p:cNvPr>
-          <p:cNvPicPr>
-            <a:picLocks noChangeAspect="1"/>
-          </p:cNvPicPr>
-          <p:nvPr/>
-        </p:nvPicPr>
-        <p:blipFill>
-          <a:blip r:embed="rId3"/>
-          <a:stretch>
-            <a:fillRect/>
-          </a:stretch>
-        </p:blipFill>
-        <p:spPr>
-          <a:xfrm>
-            <a:off x="2598825" y="2752891"/>
-            <a:ext cx="7018735" cy="3250407"/>
-          </a:xfrm>
-          <a:prstGeom prst="rect">
-            <a:avLst/>
-          </a:prstGeom>
-          <a:ln w="12700">
-            <a:miter lim="400000"/>
-          </a:ln>
-        </p:spPr>
-      </p:pic>
-      <p:sp>
-        <p:nvSpPr>
-          <p:cNvPr id="6" name="“Modern Code Review: A Case Study at Google”, Sadowski et al, ICSE 2018">
-            <a:extLst>
-              <a:ext uri="{FF2B5EF4-FFF2-40B4-BE49-F238E27FC236}">
-                <a16:creationId xmlns:a16="http://schemas.microsoft.com/office/drawing/2014/main" id="{E275DFC0-3747-5B4C-AAE2-CC8F1DCCF91F}"/>
-              </a:ext>
-            </a:extLst>
-          </p:cNvPr>
-          <p:cNvSpPr txBox="1"/>
-          <p:nvPr/>
-        </p:nvSpPr>
-        <p:spPr>
-          <a:xfrm>
-            <a:off x="3428785" y="6450290"/>
-            <a:ext cx="4900380" cy="207749"/>
-          </a:xfrm>
-          <a:prstGeom prst="rect">
-            <a:avLst/>
-          </a:prstGeom>
-          <a:ln w="12700">
-            <a:miter lim="400000"/>
-          </a:ln>
-          <a:extLst>
-            <a:ext uri="{C572A759-6A51-4108-AA02-DFA0A04FC94B}">
-              <ma14:wrappingTextBoxFlag xmlns:ma14="http://schemas.microsoft.com/office/mac/drawingml/2011/main" xmlns:a14="http://schemas.microsoft.com/office/drawing/2010/main" xmlns:m="http://schemas.openxmlformats.org/officeDocument/2006/math" xmlns="" val="1"/>
-            </a:ext>
-          </a:extLst>
-        </p:spPr>
-        <p:txBody>
-          <a:bodyPr wrap="none" lIns="19050" tIns="19050" rIns="19050" bIns="19050" anchor="ctr">
-            <a:spAutoFit/>
-          </a:bodyPr>
-          <a:lstStyle>
-            <a:lvl1pPr defTabSz="2438339">
-              <a:defRPr sz="2200"/>
-            </a:lvl1pPr>
-          </a:lstStyle>
-          <a:p>
-            <a:r>
-              <a:rPr sz="1100" dirty="0"/>
-              <a:t>“Modern Code Review: A Case Study at Google”, Sadowski et al, ICSE 2018 </a:t>
-            </a:r>
-          </a:p>
-        </p:txBody>
-      </p:sp>
     </p:spTree>
     <p:extLst>
       <p:ext uri="{BB962C8B-B14F-4D97-AF65-F5344CB8AC3E}">
-        <p14:creationId xmlns:p14="http://schemas.microsoft.com/office/powerpoint/2010/main" val="951181958"/>
+        <p14:creationId xmlns:p14="http://schemas.microsoft.com/office/powerpoint/2010/main" val="1361732932"/>
       </p:ext>
     </p:extLst>
   </p:cSld>
@@ -6555,7 +6619,43 @@
           <a:p>
             <a:r>
               <a:rPr lang="en-US" dirty="0"/>
-              <a:t>Code Review: Why (Microsoft)</a:t>
+              <a:t>Code Review: Why (Google)</a:t>
+            </a:r>
+          </a:p>
+        </p:txBody>
+      </p:sp>
+      <p:sp>
+        <p:nvSpPr>
+          <p:cNvPr id="3" name="Content Placeholder 2">
+            <a:extLst>
+              <a:ext uri="{FF2B5EF4-FFF2-40B4-BE49-F238E27FC236}">
+                <a16:creationId xmlns:a16="http://schemas.microsoft.com/office/drawing/2014/main" id="{702FC2F8-62E6-4845-915D-D1A335608C7D}"/>
+              </a:ext>
+            </a:extLst>
+          </p:cNvPr>
+          <p:cNvSpPr>
+            <a:spLocks noGrp="1"/>
+          </p:cNvSpPr>
+          <p:nvPr>
+            <p:ph idx="1"/>
+          </p:nvPr>
+        </p:nvSpPr>
+        <p:spPr>
+          <a:xfrm>
+            <a:off x="838200" y="1500160"/>
+            <a:ext cx="10646664" cy="4351338"/>
+          </a:xfrm>
+        </p:spPr>
+        <p:txBody>
+          <a:bodyPr/>
+          <a:lstStyle/>
+          <a:p>
+            <a:pPr marL="0" indent="0">
+              <a:buNone/>
+            </a:pPr>
+            <a:r>
+              <a:rPr lang="en-US" dirty="0"/>
+              <a:t>Different team members have different motivations and bring different benefits</a:t>
             </a:r>
           </a:p>
         </p:txBody>
@@ -6591,10 +6691,10 @@
       </p:sp>
       <p:pic>
         <p:nvPicPr>
-          <p:cNvPr id="9" name="Picture 8" descr="Ranked Motivations from Developers:&#10;Finding Defects (highest ranking),&#10;Code Improvement,&#10;Alternative Solutions,&#10;Knowledge Transfer,&#10;Team Awareness,&#10;Improving Development Process,&#10;Share Code Ownership,&#10;Avoid Build breaks,&#10;Track Rationale&#10;Team Assessment (lowest).">
-            <a:extLst>
-              <a:ext uri="{FF2B5EF4-FFF2-40B4-BE49-F238E27FC236}">
-                <a16:creationId xmlns:a16="http://schemas.microsoft.com/office/drawing/2014/main" id="{851D1B95-A9A5-A045-9F71-349672B25D23}"/>
+          <p:cNvPr id="5" name="Image" descr="Image">
+            <a:extLst>
+              <a:ext uri="{FF2B5EF4-FFF2-40B4-BE49-F238E27FC236}">
+                <a16:creationId xmlns:a16="http://schemas.microsoft.com/office/drawing/2014/main" id="{89BA6630-94A4-8442-A17A-5FEDA134E234}"/>
               </a:ext>
             </a:extLst>
           </p:cNvPr>
@@ -6603,28 +6703,31 @@
           </p:cNvPicPr>
           <p:nvPr/>
         </p:nvPicPr>
-        <p:blipFill rotWithShape="1">
+        <p:blipFill>
           <a:blip r:embed="rId3"/>
-          <a:srcRect b="10833"/>
-          <a:stretch/>
+          <a:stretch>
+            <a:fillRect/>
+          </a:stretch>
         </p:blipFill>
         <p:spPr>
           <a:xfrm>
-            <a:off x="2840736" y="1572976"/>
-            <a:ext cx="6689492" cy="4622723"/>
+            <a:off x="2598825" y="2752891"/>
+            <a:ext cx="7018735" cy="3250407"/>
           </a:xfrm>
           <a:prstGeom prst="rect">
             <a:avLst/>
           </a:prstGeom>
-          <a:noFill/>
+          <a:ln w="12700">
+            <a:miter lim="400000"/>
+          </a:ln>
         </p:spPr>
       </p:pic>
       <p:sp>
         <p:nvSpPr>
-          <p:cNvPr id="10" name="“Expectations, Outcomes, and Challenges of Modern Code Review”, Bacchelli &amp; Bird, ICSE 2013">
-            <a:extLst>
-              <a:ext uri="{FF2B5EF4-FFF2-40B4-BE49-F238E27FC236}">
-                <a16:creationId xmlns:a16="http://schemas.microsoft.com/office/drawing/2014/main" id="{04637158-9D4A-3241-9113-A9202311CC83}"/>
+          <p:cNvPr id="6" name="“Modern Code Review: A Case Study at Google”, Sadowski et al, ICSE 2018">
+            <a:extLst>
+              <a:ext uri="{FF2B5EF4-FFF2-40B4-BE49-F238E27FC236}">
+                <a16:creationId xmlns:a16="http://schemas.microsoft.com/office/drawing/2014/main" id="{E275DFC0-3747-5B4C-AAE2-CC8F1DCCF91F}"/>
               </a:ext>
             </a:extLst>
           </p:cNvPr>
@@ -6633,8 +6736,8 @@
         </p:nvSpPr>
         <p:spPr>
           <a:xfrm>
-            <a:off x="2803614" y="6450290"/>
-            <a:ext cx="6150723" cy="207749"/>
+            <a:off x="3428785" y="6450290"/>
+            <a:ext cx="4900380" cy="207749"/>
           </a:xfrm>
           <a:prstGeom prst="rect">
             <a:avLst/>
@@ -6644,7 +6747,7 @@
           </a:ln>
           <a:extLst>
             <a:ext uri="{C572A759-6A51-4108-AA02-DFA0A04FC94B}">
-              <ma14:wrappingTextBoxFlag xmlns:ma14="http://schemas.microsoft.com/office/mac/drawingml/2011/main" xmlns:a14="http://schemas.microsoft.com/office/drawing/2010/main" xmlns:m="http://schemas.openxmlformats.org/officeDocument/2006/math" xmlns="" val="1"/>
+              <ma14:wrappingTextBoxFlag xmlns="" xmlns:m="http://schemas.openxmlformats.org/officeDocument/2006/math" xmlns:a14="http://schemas.microsoft.com/office/drawing/2010/main" xmlns:ma14="http://schemas.microsoft.com/office/mac/drawingml/2011/main" val="1"/>
             </a:ext>
           </a:extLst>
         </p:spPr>
@@ -6660,15 +6763,7 @@
           <a:p>
             <a:r>
               <a:rPr sz="1100" dirty="0"/>
-              <a:t>“Expectations, Outcomes, and Challenges of Modern Code Review”, </a:t>
-            </a:r>
-            <a:r>
-              <a:rPr sz="1100" dirty="0" err="1"/>
-              <a:t>Bacchelli</a:t>
-            </a:r>
-            <a:r>
-              <a:rPr sz="1100" dirty="0"/>
-              <a:t> &amp; Bird, ICSE 2013</a:t>
+              <a:t>“Modern Code Review: A Case Study at Google”, Sadowski et al, ICSE 2018 </a:t>
             </a:r>
           </a:p>
         </p:txBody>
@@ -6676,7 +6771,7 @@
     </p:spTree>
     <p:extLst>
       <p:ext uri="{BB962C8B-B14F-4D97-AF65-F5344CB8AC3E}">
-        <p14:creationId xmlns:p14="http://schemas.microsoft.com/office/powerpoint/2010/main" val="3280357969"/>
+        <p14:creationId xmlns:p14="http://schemas.microsoft.com/office/powerpoint/2010/main" val="951181958"/>
       </p:ext>
     </p:extLst>
   </p:cSld>
@@ -6708,7 +6803,7 @@
           <p:cNvPr id="2" name="Title 1">
             <a:extLst>
               <a:ext uri="{FF2B5EF4-FFF2-40B4-BE49-F238E27FC236}">
-                <a16:creationId xmlns:a16="http://schemas.microsoft.com/office/drawing/2014/main" id="{B6D33575-0593-49FD-831F-131BB6CC7E6C}"/>
+                <a16:creationId xmlns:a16="http://schemas.microsoft.com/office/drawing/2014/main" id="{188DC642-3277-0841-A823-BC61351EFB71}"/>
               </a:ext>
             </a:extLst>
           </p:cNvPr>
@@ -6726,91 +6821,17 @@
           <a:p>
             <a:r>
               <a:rPr lang="en-US" dirty="0"/>
-              <a:t>Review: Learning Objectives for this Lesson</a:t>
-            </a:r>
-          </a:p>
-        </p:txBody>
-      </p:sp>
-      <p:sp>
-        <p:nvSpPr>
-          <p:cNvPr id="3" name="Text Placeholder 2">
-            <a:extLst>
-              <a:ext uri="{FF2B5EF4-FFF2-40B4-BE49-F238E27FC236}">
-                <a16:creationId xmlns:a16="http://schemas.microsoft.com/office/drawing/2014/main" id="{5B21ECCD-9823-405F-AA9A-D0CC235AD583}"/>
-              </a:ext>
-            </a:extLst>
-          </p:cNvPr>
-          <p:cNvSpPr>
-            <a:spLocks noGrp="1"/>
-          </p:cNvSpPr>
-          <p:nvPr>
-            <p:ph idx="1"/>
-          </p:nvPr>
-        </p:nvSpPr>
-        <p:spPr/>
-        <p:txBody>
-          <a:bodyPr/>
-          <a:lstStyle/>
-          <a:p>
-            <a:r>
-              <a:rPr lang="en-US" dirty="0"/>
-              <a:t>You should now be able to:</a:t>
-            </a:r>
-          </a:p>
-          <a:p>
-            <a:pPr lvl="1"/>
-            <a:r>
-              <a:rPr lang="en-US" dirty="0"/>
-              <a:t>Articulate what a </a:t>
-            </a:r>
-            <a:r>
-              <a:rPr lang="en-US" i="1" dirty="0"/>
-              <a:t>code review </a:t>
-            </a:r>
-            <a:r>
-              <a:rPr lang="en-US" dirty="0"/>
-              <a:t>is;</a:t>
-            </a:r>
-          </a:p>
-          <a:p>
-            <a:pPr lvl="1" fontAlgn="base"/>
-            <a:r>
-              <a:rPr lang="en-US" dirty="0"/>
-              <a:t>List the roles of people in code reviews;</a:t>
-            </a:r>
-          </a:p>
-          <a:p>
-            <a:pPr lvl="1" fontAlgn="base"/>
-            <a:r>
-              <a:rPr lang="en-US" dirty="0"/>
-              <a:t>Explain an appropriate time for code reviews;</a:t>
-            </a:r>
-          </a:p>
-          <a:p>
-            <a:pPr lvl="1" fontAlgn="base"/>
-            <a:r>
-              <a:rPr lang="en-US" dirty="0"/>
-              <a:t>Illustrate one way to hold a code review;</a:t>
-            </a:r>
-          </a:p>
-          <a:p>
-            <a:pPr lvl="1" fontAlgn="base"/>
-            <a:r>
-              <a:rPr lang="en-US" dirty="0"/>
-              <a:t>Describe the benefits of a culture of code review.</a:t>
-            </a:r>
-          </a:p>
-          <a:p>
-            <a:endParaRPr lang="en-US" dirty="0"/>
-          </a:p>
-        </p:txBody>
-      </p:sp>
-      <p:sp>
-        <p:nvSpPr>
-          <p:cNvPr id="5" name="Slide Number Placeholder 4">
-            <a:extLst>
-              <a:ext uri="{FF2B5EF4-FFF2-40B4-BE49-F238E27FC236}">
-                <a16:creationId xmlns:a16="http://schemas.microsoft.com/office/drawing/2014/main" id="{D3CB1048-3EB8-4281-8361-E7EB70F6FBBC}"/>
+              <a:t>Code Review: Why (Microsoft)</a:t>
+            </a:r>
+          </a:p>
+        </p:txBody>
+      </p:sp>
+      <p:sp>
+        <p:nvSpPr>
+          <p:cNvPr id="4" name="Slide Number Placeholder 3">
+            <a:extLst>
+              <a:ext uri="{FF2B5EF4-FFF2-40B4-BE49-F238E27FC236}">
+                <a16:creationId xmlns:a16="http://schemas.microsoft.com/office/drawing/2014/main" id="{255FE36A-883B-0148-8025-988C8F4EEBD1}"/>
               </a:ext>
             </a:extLst>
           </p:cNvPr>
@@ -6826,19 +6847,102 @@
           <a:bodyPr/>
           <a:lstStyle/>
           <a:p>
-            <a:fld id="{86CB4B4D-7CA3-9044-876B-883B54F8677D}" type="slidenum">
+            <a:fld id="{20F37917-FD3A-4669-9018-DA04BCDD3D75}" type="slidenum">
               <a:rPr lang="en-US" smtClean="0"/>
-              <a:pPr/>
               <a:t>15</a:t>
             </a:fld>
             <a:endParaRPr lang="en-US"/>
           </a:p>
         </p:txBody>
       </p:sp>
+      <p:pic>
+        <p:nvPicPr>
+          <p:cNvPr id="9" name="Picture 8" descr="Ranked Motivations from Developers:&#10;Finding Defects (highest ranking),&#10;Code Improvement,&#10;Alternative Solutions,&#10;Knowledge Transfer,&#10;Team Awareness,&#10;Improving Development Process,&#10;Share Code Ownership,&#10;Avoid Build breaks,&#10;Track Rationale&#10;Team Assessment (lowest).">
+            <a:extLst>
+              <a:ext uri="{FF2B5EF4-FFF2-40B4-BE49-F238E27FC236}">
+                <a16:creationId xmlns:a16="http://schemas.microsoft.com/office/drawing/2014/main" id="{851D1B95-A9A5-A045-9F71-349672B25D23}"/>
+              </a:ext>
+            </a:extLst>
+          </p:cNvPr>
+          <p:cNvPicPr>
+            <a:picLocks noChangeAspect="1"/>
+          </p:cNvPicPr>
+          <p:nvPr/>
+        </p:nvPicPr>
+        <p:blipFill rotWithShape="1">
+          <a:blip r:embed="rId3"/>
+          <a:srcRect b="10833"/>
+          <a:stretch/>
+        </p:blipFill>
+        <p:spPr>
+          <a:xfrm>
+            <a:off x="2840736" y="1572976"/>
+            <a:ext cx="6689492" cy="4622723"/>
+          </a:xfrm>
+          <a:prstGeom prst="rect">
+            <a:avLst/>
+          </a:prstGeom>
+          <a:noFill/>
+        </p:spPr>
+      </p:pic>
+      <p:sp>
+        <p:nvSpPr>
+          <p:cNvPr id="10" name="“Expectations, Outcomes, and Challenges of Modern Code Review”, Bacchelli &amp; Bird, ICSE 2013">
+            <a:extLst>
+              <a:ext uri="{FF2B5EF4-FFF2-40B4-BE49-F238E27FC236}">
+                <a16:creationId xmlns:a16="http://schemas.microsoft.com/office/drawing/2014/main" id="{04637158-9D4A-3241-9113-A9202311CC83}"/>
+              </a:ext>
+            </a:extLst>
+          </p:cNvPr>
+          <p:cNvSpPr txBox="1"/>
+          <p:nvPr/>
+        </p:nvSpPr>
+        <p:spPr>
+          <a:xfrm>
+            <a:off x="2803614" y="6450290"/>
+            <a:ext cx="6150723" cy="207749"/>
+          </a:xfrm>
+          <a:prstGeom prst="rect">
+            <a:avLst/>
+          </a:prstGeom>
+          <a:ln w="12700">
+            <a:miter lim="400000"/>
+          </a:ln>
+          <a:extLst>
+            <a:ext uri="{C572A759-6A51-4108-AA02-DFA0A04FC94B}">
+              <ma14:wrappingTextBoxFlag xmlns="" xmlns:m="http://schemas.openxmlformats.org/officeDocument/2006/math" xmlns:a14="http://schemas.microsoft.com/office/drawing/2010/main" xmlns:ma14="http://schemas.microsoft.com/office/mac/drawingml/2011/main" val="1"/>
+            </a:ext>
+          </a:extLst>
+        </p:spPr>
+        <p:txBody>
+          <a:bodyPr wrap="none" lIns="19050" tIns="19050" rIns="19050" bIns="19050" anchor="ctr">
+            <a:spAutoFit/>
+          </a:bodyPr>
+          <a:lstStyle>
+            <a:lvl1pPr defTabSz="2438339">
+              <a:defRPr sz="2200"/>
+            </a:lvl1pPr>
+          </a:lstStyle>
+          <a:p>
+            <a:r>
+              <a:rPr sz="1100" dirty="0"/>
+              <a:t>“Expectations, Outcomes, and Challenges of Modern Code Review”, </a:t>
+            </a:r>
+            <a:r>
+              <a:rPr sz="1100" dirty="0" err="1"/>
+              <a:t>Bacchelli</a:t>
+            </a:r>
+            <a:r>
+              <a:rPr sz="1100" dirty="0"/>
+              <a:t> &amp; Bird, ICSE 2013</a:t>
+            </a:r>
+          </a:p>
+        </p:txBody>
+      </p:sp>
     </p:spTree>
     <p:extLst>
       <p:ext uri="{BB962C8B-B14F-4D97-AF65-F5344CB8AC3E}">
-        <p14:creationId xmlns:p14="http://schemas.microsoft.com/office/powerpoint/2010/main" val="2643922941"/>
+        <p14:creationId xmlns:p14="http://schemas.microsoft.com/office/powerpoint/2010/main" val="3280357969"/>
       </p:ext>
     </p:extLst>
   </p:cSld>
@@ -6870,6 +6974,325 @@
           <p:cNvPr id="2" name="Title 1">
             <a:extLst>
               <a:ext uri="{FF2B5EF4-FFF2-40B4-BE49-F238E27FC236}">
+                <a16:creationId xmlns:a16="http://schemas.microsoft.com/office/drawing/2014/main" id="{293BB5B3-0251-1F4A-A98B-9561DA340917}"/>
+              </a:ext>
+            </a:extLst>
+          </p:cNvPr>
+          <p:cNvSpPr>
+            <a:spLocks noGrp="1"/>
+          </p:cNvSpPr>
+          <p:nvPr>
+            <p:ph type="title"/>
+          </p:nvPr>
+        </p:nvSpPr>
+        <p:spPr/>
+        <p:txBody>
+          <a:bodyPr/>
+          <a:lstStyle/>
+          <a:p>
+            <a:r>
+              <a:rPr lang="en-US" dirty="0"/>
+              <a:t>A Note on Programmer’s Ego</a:t>
+            </a:r>
+          </a:p>
+        </p:txBody>
+      </p:sp>
+      <p:sp>
+        <p:nvSpPr>
+          <p:cNvPr id="3" name="Content Placeholder 2">
+            <a:extLst>
+              <a:ext uri="{FF2B5EF4-FFF2-40B4-BE49-F238E27FC236}">
+                <a16:creationId xmlns:a16="http://schemas.microsoft.com/office/drawing/2014/main" id="{2D1A0041-3DBA-E848-8076-A3C77EBEB6B4}"/>
+              </a:ext>
+            </a:extLst>
+          </p:cNvPr>
+          <p:cNvSpPr>
+            <a:spLocks noGrp="1"/>
+          </p:cNvSpPr>
+          <p:nvPr>
+            <p:ph idx="1"/>
+          </p:nvPr>
+        </p:nvSpPr>
+        <p:spPr>
+          <a:xfrm>
+            <a:off x="838200" y="1500160"/>
+            <a:ext cx="10515600" cy="4351338"/>
+          </a:xfrm>
+        </p:spPr>
+        <p:txBody>
+          <a:bodyPr/>
+          <a:lstStyle/>
+          <a:p>
+            <a:pPr fontAlgn="auto"/>
+            <a:r>
+              <a:rPr lang="en-US" dirty="0"/>
+              <a:t>Someone looking over your work </a:t>
+            </a:r>
+          </a:p>
+          <a:p>
+            <a:pPr fontAlgn="auto"/>
+            <a:r>
+              <a:rPr lang="en-US" dirty="0"/>
+              <a:t>Probably some attachment to it </a:t>
+            </a:r>
+          </a:p>
+          <a:p>
+            <a:pPr fontAlgn="auto"/>
+            <a:r>
+              <a:rPr lang="en-US" dirty="0"/>
+              <a:t>Criticisms: sometimes hard not to take personally </a:t>
+            </a:r>
+          </a:p>
+          <a:p>
+            <a:pPr fontAlgn="auto"/>
+            <a:r>
+              <a:rPr lang="en-US" dirty="0"/>
+              <a:t>Acknowledge a criticism and move on </a:t>
+            </a:r>
+          </a:p>
+          <a:p>
+            <a:r>
+              <a:rPr lang="en-US" dirty="0"/>
+              <a:t>Acknowledgment doesn’t imply that the author agrees with the content of the criticism </a:t>
+            </a:r>
+          </a:p>
+          <a:p>
+            <a:r>
+              <a:rPr lang="en-US" dirty="0"/>
+              <a:t>Author should not try to defend the work under review </a:t>
+            </a:r>
+          </a:p>
+          <a:p>
+            <a:endParaRPr lang="en-US" dirty="0"/>
+          </a:p>
+        </p:txBody>
+      </p:sp>
+      <p:sp>
+        <p:nvSpPr>
+          <p:cNvPr id="4" name="Slide Number Placeholder 3">
+            <a:extLst>
+              <a:ext uri="{FF2B5EF4-FFF2-40B4-BE49-F238E27FC236}">
+                <a16:creationId xmlns:a16="http://schemas.microsoft.com/office/drawing/2014/main" id="{248E95F8-2A27-9D49-A9EB-CA2A2706DDD7}"/>
+              </a:ext>
+            </a:extLst>
+          </p:cNvPr>
+          <p:cNvSpPr>
+            <a:spLocks noGrp="1"/>
+          </p:cNvSpPr>
+          <p:nvPr>
+            <p:ph type="sldNum" sz="quarter" idx="12"/>
+          </p:nvPr>
+        </p:nvSpPr>
+        <p:spPr/>
+        <p:txBody>
+          <a:bodyPr/>
+          <a:lstStyle/>
+          <a:p>
+            <a:fld id="{20F37917-FD3A-4669-9018-DA04BCDD3D75}" type="slidenum">
+              <a:rPr lang="en-US" smtClean="0"/>
+              <a:t>16</a:t>
+            </a:fld>
+            <a:endParaRPr lang="en-US"/>
+          </a:p>
+        </p:txBody>
+      </p:sp>
+    </p:spTree>
+    <p:extLst>
+      <p:ext uri="{BB962C8B-B14F-4D97-AF65-F5344CB8AC3E}">
+        <p14:creationId xmlns:p14="http://schemas.microsoft.com/office/powerpoint/2010/main" val="3430888273"/>
+      </p:ext>
+    </p:extLst>
+  </p:cSld>
+  <p:clrMapOvr>
+    <a:masterClrMapping/>
+  </p:clrMapOvr>
+</p:sld>
+</file>
+
+<file path=ppt/slides/slide17.xml><?xml version="1.0" encoding="utf-8"?>
+<p:sld xmlns:a="http://schemas.openxmlformats.org/drawingml/2006/main" xmlns:r="http://schemas.openxmlformats.org/officeDocument/2006/relationships" xmlns:p="http://schemas.openxmlformats.org/presentationml/2006/main">
+  <p:cSld>
+    <p:spTree>
+      <p:nvGrpSpPr>
+        <p:cNvPr id="1" name=""/>
+        <p:cNvGrpSpPr/>
+        <p:nvPr/>
+      </p:nvGrpSpPr>
+      <p:grpSpPr>
+        <a:xfrm>
+          <a:off x="0" y="0"/>
+          <a:ext cx="0" cy="0"/>
+          <a:chOff x="0" y="0"/>
+          <a:chExt cx="0" cy="0"/>
+        </a:xfrm>
+      </p:grpSpPr>
+      <p:sp>
+        <p:nvSpPr>
+          <p:cNvPr id="2" name="Title 1">
+            <a:extLst>
+              <a:ext uri="{FF2B5EF4-FFF2-40B4-BE49-F238E27FC236}">
+                <a16:creationId xmlns:a16="http://schemas.microsoft.com/office/drawing/2014/main" id="{B6D33575-0593-49FD-831F-131BB6CC7E6C}"/>
+              </a:ext>
+            </a:extLst>
+          </p:cNvPr>
+          <p:cNvSpPr>
+            <a:spLocks noGrp="1"/>
+          </p:cNvSpPr>
+          <p:nvPr>
+            <p:ph type="title"/>
+          </p:nvPr>
+        </p:nvSpPr>
+        <p:spPr/>
+        <p:txBody>
+          <a:bodyPr/>
+          <a:lstStyle/>
+          <a:p>
+            <a:r>
+              <a:rPr lang="en-US" dirty="0"/>
+              <a:t>Review: Learning Objectives for this Lesson</a:t>
+            </a:r>
+          </a:p>
+        </p:txBody>
+      </p:sp>
+      <p:sp>
+        <p:nvSpPr>
+          <p:cNvPr id="3" name="Text Placeholder 2">
+            <a:extLst>
+              <a:ext uri="{FF2B5EF4-FFF2-40B4-BE49-F238E27FC236}">
+                <a16:creationId xmlns:a16="http://schemas.microsoft.com/office/drawing/2014/main" id="{5B21ECCD-9823-405F-AA9A-D0CC235AD583}"/>
+              </a:ext>
+            </a:extLst>
+          </p:cNvPr>
+          <p:cNvSpPr>
+            <a:spLocks noGrp="1"/>
+          </p:cNvSpPr>
+          <p:nvPr>
+            <p:ph idx="1"/>
+          </p:nvPr>
+        </p:nvSpPr>
+        <p:spPr/>
+        <p:txBody>
+          <a:bodyPr/>
+          <a:lstStyle/>
+          <a:p>
+            <a:r>
+              <a:rPr lang="en-US" dirty="0"/>
+              <a:t>You should now be able to:</a:t>
+            </a:r>
+          </a:p>
+          <a:p>
+            <a:pPr lvl="1"/>
+            <a:r>
+              <a:rPr lang="en-US" dirty="0"/>
+              <a:t>Articulate what a </a:t>
+            </a:r>
+            <a:r>
+              <a:rPr lang="en-US" i="1" dirty="0"/>
+              <a:t>code review </a:t>
+            </a:r>
+            <a:r>
+              <a:rPr lang="en-US" dirty="0"/>
+              <a:t>is;</a:t>
+            </a:r>
+          </a:p>
+          <a:p>
+            <a:pPr lvl="1" fontAlgn="base"/>
+            <a:r>
+              <a:rPr lang="en-US" dirty="0"/>
+              <a:t>List the roles of people in code reviews;</a:t>
+            </a:r>
+          </a:p>
+          <a:p>
+            <a:pPr lvl="1" fontAlgn="base"/>
+            <a:r>
+              <a:rPr lang="en-US" dirty="0"/>
+              <a:t>Explain an appropriate time for code reviews;</a:t>
+            </a:r>
+          </a:p>
+          <a:p>
+            <a:pPr lvl="1" fontAlgn="base"/>
+            <a:r>
+              <a:rPr lang="en-US" dirty="0"/>
+              <a:t>Illustrate one way to hold a code review;</a:t>
+            </a:r>
+          </a:p>
+          <a:p>
+            <a:pPr lvl="1" fontAlgn="base"/>
+            <a:r>
+              <a:rPr lang="en-US" dirty="0"/>
+              <a:t>Describe the benefits of a culture of code review.</a:t>
+            </a:r>
+          </a:p>
+          <a:p>
+            <a:endParaRPr lang="en-US" dirty="0"/>
+          </a:p>
+        </p:txBody>
+      </p:sp>
+      <p:sp>
+        <p:nvSpPr>
+          <p:cNvPr id="5" name="Slide Number Placeholder 4">
+            <a:extLst>
+              <a:ext uri="{FF2B5EF4-FFF2-40B4-BE49-F238E27FC236}">
+                <a16:creationId xmlns:a16="http://schemas.microsoft.com/office/drawing/2014/main" id="{D3CB1048-3EB8-4281-8361-E7EB70F6FBBC}"/>
+              </a:ext>
+            </a:extLst>
+          </p:cNvPr>
+          <p:cNvSpPr>
+            <a:spLocks noGrp="1"/>
+          </p:cNvSpPr>
+          <p:nvPr>
+            <p:ph type="sldNum" sz="quarter" idx="12"/>
+          </p:nvPr>
+        </p:nvSpPr>
+        <p:spPr/>
+        <p:txBody>
+          <a:bodyPr/>
+          <a:lstStyle/>
+          <a:p>
+            <a:fld id="{86CB4B4D-7CA3-9044-876B-883B54F8677D}" type="slidenum">
+              <a:rPr lang="en-US" smtClean="0"/>
+              <a:pPr/>
+              <a:t>17</a:t>
+            </a:fld>
+            <a:endParaRPr lang="en-US"/>
+          </a:p>
+        </p:txBody>
+      </p:sp>
+    </p:spTree>
+    <p:extLst>
+      <p:ext uri="{BB962C8B-B14F-4D97-AF65-F5344CB8AC3E}">
+        <p14:creationId xmlns:p14="http://schemas.microsoft.com/office/powerpoint/2010/main" val="2643922941"/>
+      </p:ext>
+    </p:extLst>
+  </p:cSld>
+  <p:clrMapOvr>
+    <a:masterClrMapping/>
+  </p:clrMapOvr>
+</p:sld>
+</file>
+
+<file path=ppt/slides/slide18.xml><?xml version="1.0" encoding="utf-8"?>
+<p:sld xmlns:a="http://schemas.openxmlformats.org/drawingml/2006/main" xmlns:r="http://schemas.openxmlformats.org/officeDocument/2006/relationships" xmlns:p="http://schemas.openxmlformats.org/presentationml/2006/main">
+  <p:cSld>
+    <p:spTree>
+      <p:nvGrpSpPr>
+        <p:cNvPr id="1" name=""/>
+        <p:cNvGrpSpPr/>
+        <p:nvPr/>
+      </p:nvGrpSpPr>
+      <p:grpSpPr>
+        <a:xfrm>
+          <a:off x="0" y="0"/>
+          <a:ext cx="0" cy="0"/>
+          <a:chOff x="0" y="0"/>
+          <a:chExt cx="0" cy="0"/>
+        </a:xfrm>
+      </p:grpSpPr>
+      <p:sp>
+        <p:nvSpPr>
+          <p:cNvPr id="2" name="Title 1">
+            <a:extLst>
+              <a:ext uri="{FF2B5EF4-FFF2-40B4-BE49-F238E27FC236}">
                 <a16:creationId xmlns:a16="http://schemas.microsoft.com/office/drawing/2014/main" id="{7EB782C9-1CF8-40AE-A725-0968E5F17117}"/>
               </a:ext>
             </a:extLst>
@@ -6958,7 +7381,7 @@
               <a:pPr defTabSz="547695">
                 <a:defRPr/>
               </a:pPr>
-              <a:t>16</a:t>
+              <a:t>18</a:t>
             </a:fld>
             <a:endParaRPr lang="en-US"/>
           </a:p>
@@ -7436,7 +7859,7 @@
           <p:cNvPr id="2" name="Title 1">
             <a:extLst>
               <a:ext uri="{FF2B5EF4-FFF2-40B4-BE49-F238E27FC236}">
-                <a16:creationId xmlns:a16="http://schemas.microsoft.com/office/drawing/2014/main" id="{A80E123E-67C0-DD49-920D-3BD8874A9EB8}"/>
+                <a16:creationId xmlns:a16="http://schemas.microsoft.com/office/drawing/2014/main" id="{57F840D4-E6DC-AC4A-AEC6-719BE443206A}"/>
               </a:ext>
             </a:extLst>
           </p:cNvPr>
@@ -7454,15 +7877,7 @@
           <a:p>
             <a:r>
               <a:rPr lang="en-US" dirty="0"/>
-              <a:t>Code </a:t>
-            </a:r>
-            <a:r>
-              <a:rPr lang="en-US" i="1" dirty="0"/>
-              <a:t>Inspection</a:t>
-            </a:r>
-            <a:r>
-              <a:rPr lang="en-US" dirty="0"/>
-              <a:t> is Heavier Weight</a:t>
+              <a:t>Code Should be Read, not Just Run</a:t>
             </a:r>
           </a:p>
         </p:txBody>
@@ -7472,21 +7887,21 @@
           <p:cNvPr id="3" name="Content Placeholder 2">
             <a:extLst>
               <a:ext uri="{FF2B5EF4-FFF2-40B4-BE49-F238E27FC236}">
-                <a16:creationId xmlns:a16="http://schemas.microsoft.com/office/drawing/2014/main" id="{40C5FE23-4EAD-C54B-BB96-F8B153F1084B}"/>
-              </a:ext>
-            </a:extLst>
-          </p:cNvPr>
-          <p:cNvSpPr>
-            <a:spLocks noGrp="1"/>
-          </p:cNvSpPr>
-          <p:nvPr>
-            <p:ph idx="1"/>
+                <a16:creationId xmlns:a16="http://schemas.microsoft.com/office/drawing/2014/main" id="{72C46E8C-398A-0042-A932-296BDF23F858}"/>
+              </a:ext>
+            </a:extLst>
+          </p:cNvPr>
+          <p:cNvSpPr>
+            <a:spLocks noGrp="1"/>
+          </p:cNvSpPr>
+          <p:nvPr>
+            <p:ph sz="half" idx="1"/>
           </p:nvPr>
         </p:nvSpPr>
         <p:spPr>
           <a:xfrm>
-            <a:off x="838200" y="1500160"/>
-            <a:ext cx="10305288" cy="4351338"/>
+            <a:off x="838200" y="1825625"/>
+            <a:ext cx="10515600" cy="4351338"/>
           </a:xfrm>
         </p:spPr>
         <p:txBody>
@@ -7495,50 +7910,41 @@
           <a:p>
             <a:r>
               <a:rPr lang="en-US" dirty="0"/>
-              <a:t>Formal process of reading through code as a group;</a:t>
-            </a:r>
-          </a:p>
-          <a:p>
-            <a:r>
-              <a:rPr lang="en-US" dirty="0"/>
-              <a:t>Applied to all project documents;</a:t>
-            </a:r>
-          </a:p>
-          <a:p>
-            <a:r>
-              <a:rPr lang="en-US" dirty="0"/>
-              <a:t>A 3-5 person team reads the code aloud and explains what is being done;</a:t>
-            </a:r>
-          </a:p>
-          <a:p>
-            <a:r>
-              <a:rPr lang="en-US" dirty="0"/>
-              <a:t>Usually a 60 minute meeting;</a:t>
-            </a:r>
-          </a:p>
-          <a:p>
-            <a:r>
-              <a:rPr lang="en-US" dirty="0"/>
-              <a:t>Less efficient (defects/cost) than modern review processes.</a:t>
-            </a:r>
-          </a:p>
-          <a:p>
-            <a:r>
-              <a:rPr lang="en-US" dirty="0"/>
-              <a:t>Very waterfall.</a:t>
-            </a:r>
-          </a:p>
-          <a:p>
-            <a:endParaRPr lang="en-US" dirty="0"/>
-          </a:p>
-        </p:txBody>
-      </p:sp>
-      <p:sp>
-        <p:nvSpPr>
-          <p:cNvPr id="4" name="Slide Number Placeholder 3">
-            <a:extLst>
-              <a:ext uri="{FF2B5EF4-FFF2-40B4-BE49-F238E27FC236}">
-                <a16:creationId xmlns:a16="http://schemas.microsoft.com/office/drawing/2014/main" id="{1B2940CF-25F4-6544-9DF5-A8748495FE67}"/>
+              <a:t>Requirements and design documents are usually read by multiple people - who often didn’t write them</a:t>
+            </a:r>
+          </a:p>
+          <a:p>
+            <a:r>
+              <a:rPr lang="en-US" dirty="0"/>
+              <a:t>There are meetings, discussions</a:t>
+            </a:r>
+          </a:p>
+          <a:p>
+            <a:r>
+              <a:rPr lang="en-US" dirty="0"/>
+              <a:t>Customers, managers, developers, Q&amp;A provide input</a:t>
+            </a:r>
+          </a:p>
+          <a:p>
+            <a:r>
+              <a:rPr lang="en-US" dirty="0"/>
+              <a:t>Should code get released having been read just by its author?</a:t>
+            </a:r>
+          </a:p>
+          <a:p>
+            <a:r>
+              <a:rPr lang="en-US" dirty="0"/>
+              <a:t>Think of books: nothing is commercially published without scrutiny and input from editors</a:t>
+            </a:r>
+          </a:p>
+        </p:txBody>
+      </p:sp>
+      <p:sp>
+        <p:nvSpPr>
+          <p:cNvPr id="5" name="Slide Number Placeholder 4">
+            <a:extLst>
+              <a:ext uri="{FF2B5EF4-FFF2-40B4-BE49-F238E27FC236}">
+                <a16:creationId xmlns:a16="http://schemas.microsoft.com/office/drawing/2014/main" id="{DA33A968-CE63-8240-8861-C58A56B95D67}"/>
               </a:ext>
             </a:extLst>
           </p:cNvPr>
@@ -7565,7 +7971,7 @@
     </p:spTree>
     <p:extLst>
       <p:ext uri="{BB962C8B-B14F-4D97-AF65-F5344CB8AC3E}">
-        <p14:creationId xmlns:p14="http://schemas.microsoft.com/office/powerpoint/2010/main" val="3819959743"/>
+        <p14:creationId xmlns:p14="http://schemas.microsoft.com/office/powerpoint/2010/main" val="3622644280"/>
       </p:ext>
     </p:extLst>
   </p:cSld>
@@ -7597,7 +8003,7 @@
           <p:cNvPr id="2" name="Title 1">
             <a:extLst>
               <a:ext uri="{FF2B5EF4-FFF2-40B4-BE49-F238E27FC236}">
-                <a16:creationId xmlns:a16="http://schemas.microsoft.com/office/drawing/2014/main" id="{2C87D72B-777F-9A40-97B8-47699755CF12}"/>
+                <a16:creationId xmlns:a16="http://schemas.microsoft.com/office/drawing/2014/main" id="{A80E123E-67C0-DD49-920D-3BD8874A9EB8}"/>
               </a:ext>
             </a:extLst>
           </p:cNvPr>
@@ -7615,7 +8021,15 @@
           <a:p>
             <a:r>
               <a:rPr lang="en-US" dirty="0"/>
-              <a:t>Code Review: What</a:t>
+              <a:t>Code </a:t>
+            </a:r>
+            <a:r>
+              <a:rPr lang="en-US" i="1" dirty="0"/>
+              <a:t>Inspection</a:t>
+            </a:r>
+            <a:r>
+              <a:rPr lang="en-US" dirty="0"/>
+              <a:t> is Heavier Weight</a:t>
             </a:r>
           </a:p>
         </p:txBody>
@@ -7625,7 +8039,7 @@
           <p:cNvPr id="3" name="Content Placeholder 2">
             <a:extLst>
               <a:ext uri="{FF2B5EF4-FFF2-40B4-BE49-F238E27FC236}">
-                <a16:creationId xmlns:a16="http://schemas.microsoft.com/office/drawing/2014/main" id="{56707E37-D232-8541-B440-42E1BE109664}"/>
+                <a16:creationId xmlns:a16="http://schemas.microsoft.com/office/drawing/2014/main" id="{40C5FE23-4EAD-C54B-BB96-F8B153F1084B}"/>
               </a:ext>
             </a:extLst>
           </p:cNvPr>
@@ -7636,101 +8050,70 @@
             <p:ph idx="1"/>
           </p:nvPr>
         </p:nvSpPr>
-        <p:spPr/>
+        <p:spPr>
+          <a:xfrm>
+            <a:off x="838200" y="1500160"/>
+            <a:ext cx="10305288" cy="4351338"/>
+          </a:xfrm>
+        </p:spPr>
         <p:txBody>
           <a:bodyPr>
-            <a:noAutofit/>
+            <a:normAutofit fontScale="92500" lnSpcReduction="10000"/>
           </a:bodyPr>
           <a:lstStyle/>
           <a:p>
             <a:r>
               <a:rPr lang="en-US" dirty="0"/>
-              <a:t>A code review is the process in which the author of some code is asked to explain it to their peers:</a:t>
-            </a:r>
-          </a:p>
-          <a:p>
-            <a:pPr lvl="1"/>
-            <a:r>
-              <a:rPr lang="en-US" dirty="0"/>
-              <a:t>What purpose the code has;</a:t>
-            </a:r>
-          </a:p>
-          <a:p>
-            <a:pPr lvl="1"/>
-            <a:r>
-              <a:rPr lang="en-US" dirty="0"/>
-              <a:t>How the code accomplishes this purpose;</a:t>
-            </a:r>
-          </a:p>
-          <a:p>
-            <a:pPr lvl="1"/>
-            <a:r>
-              <a:rPr lang="en-US" dirty="0"/>
-              <a:t>How the author is confident of this information,</a:t>
-            </a:r>
-          </a:p>
-          <a:p>
-            <a:pPr lvl="2"/>
-            <a:r>
-              <a:rPr lang="en-US" dirty="0"/>
-              <a:t>E.g., show results of running tests.</a:t>
-            </a:r>
-          </a:p>
-          <a:p>
-            <a:r>
-              <a:rPr lang="en-US" dirty="0"/>
-              <a:t>A code review often concerns a code </a:t>
-            </a:r>
-            <a:r>
-              <a:rPr lang="en-US" i="1" dirty="0"/>
-              <a:t>change.</a:t>
-            </a:r>
-            <a:r>
-              <a:rPr lang="en-US" dirty="0"/>
-              <a:t> </a:t>
-            </a:r>
-          </a:p>
-          <a:p>
-            <a:r>
-              <a:rPr lang="en-US" dirty="0"/>
-              <a:t>A code review doesn’t assume anything is wrong.</a:t>
-            </a:r>
-          </a:p>
-          <a:p>
-            <a:r>
-              <a:rPr lang="en-US" dirty="0"/>
-              <a:t>A code review isn’t “selling” the code. </a:t>
-            </a:r>
-          </a:p>
-          <a:p>
-            <a:r>
-              <a:rPr lang="en-US" dirty="0"/>
-              <a:t>See </a:t>
-            </a:r>
-            <a:r>
-              <a:rPr lang="en-US" dirty="0">
-                <a:hlinkClick r:id="rId3"/>
-              </a:rPr>
-              <a:t>Chapter 9</a:t>
-            </a:r>
-            <a:r>
-              <a:rPr lang="en-US" dirty="0"/>
-              <a:t> in </a:t>
-            </a:r>
-            <a:r>
-              <a:rPr lang="en-US" dirty="0" err="1"/>
-              <a:t>SoftEng</a:t>
-            </a:r>
-            <a:r>
-              <a:rPr lang="en-US" dirty="0"/>
-              <a:t> @ Google</a:t>
-            </a:r>
-          </a:p>
-          <a:p>
-            <a:pPr marL="0" indent="0">
-              <a:buNone/>
-            </a:pPr>
-            <a:endParaRPr lang="en-US" dirty="0"/>
+              <a:t>Formal process of reading through code as a group;</a:t>
+            </a:r>
+          </a:p>
+          <a:p>
+            <a:r>
+              <a:rPr lang="en-US" dirty="0"/>
+              <a:t>Applied to all project documents;</a:t>
+            </a:r>
+          </a:p>
+          <a:p>
+            <a:r>
+              <a:rPr lang="en-US" dirty="0"/>
+              <a:t>A 3-5 person team reads the code aloud and explains what is being done;</a:t>
+            </a:r>
+          </a:p>
+          <a:p>
+            <a:r>
+              <a:rPr lang="en-US" dirty="0"/>
+              <a:t>Each person has a specific role (moderator, reviewer, reader, scribe, observer, author)</a:t>
+            </a:r>
+          </a:p>
+          <a:p>
+            <a:r>
+              <a:rPr lang="en-US" dirty="0"/>
+              <a:t>Note, the author does not present their code</a:t>
+            </a:r>
+          </a:p>
+          <a:p>
+            <a:r>
+              <a:rPr lang="en-US" dirty="0"/>
+              <a:t>Usually a 60 minute meeting;</a:t>
+            </a:r>
+          </a:p>
+          <a:p>
+            <a:r>
+              <a:rPr lang="en-US" dirty="0"/>
+              <a:t>Less efficient (defects/cost) than modern review processes.</a:t>
+            </a:r>
+          </a:p>
+          <a:p>
+            <a:r>
+              <a:rPr lang="en-US" dirty="0"/>
+              <a:t>Very waterfall.</a:t>
+            </a:r>
+          </a:p>
+          <a:p>
+            <a:r>
+              <a:rPr lang="en-US" dirty="0"/>
+              <a:t>Traceable, measurable</a:t>
+            </a:r>
           </a:p>
         </p:txBody>
       </p:sp>
@@ -7739,7 +8122,7 @@
           <p:cNvPr id="4" name="Slide Number Placeholder 3">
             <a:extLst>
               <a:ext uri="{FF2B5EF4-FFF2-40B4-BE49-F238E27FC236}">
-                <a16:creationId xmlns:a16="http://schemas.microsoft.com/office/drawing/2014/main" id="{5C5054CB-8275-4A48-86C8-1B05D6355F7F}"/>
+                <a16:creationId xmlns:a16="http://schemas.microsoft.com/office/drawing/2014/main" id="{1B2940CF-25F4-6544-9DF5-A8748495FE67}"/>
               </a:ext>
             </a:extLst>
           </p:cNvPr>
@@ -7766,7 +8149,7 @@
     </p:spTree>
     <p:extLst>
       <p:ext uri="{BB962C8B-B14F-4D97-AF65-F5344CB8AC3E}">
-        <p14:creationId xmlns:p14="http://schemas.microsoft.com/office/powerpoint/2010/main" val="1897934589"/>
+        <p14:creationId xmlns:p14="http://schemas.microsoft.com/office/powerpoint/2010/main" val="3819959743"/>
       </p:ext>
     </p:extLst>
   </p:cSld>
@@ -7798,7 +8181,7 @@
           <p:cNvPr id="2" name="Title 1">
             <a:extLst>
               <a:ext uri="{FF2B5EF4-FFF2-40B4-BE49-F238E27FC236}">
-                <a16:creationId xmlns:a16="http://schemas.microsoft.com/office/drawing/2014/main" id="{3A90754E-3D30-E94B-AA03-9161C0C3F151}"/>
+                <a16:creationId xmlns:a16="http://schemas.microsoft.com/office/drawing/2014/main" id="{2C87D72B-777F-9A40-97B8-47699755CF12}"/>
               </a:ext>
             </a:extLst>
           </p:cNvPr>
@@ -7816,7 +8199,7 @@
           <a:p>
             <a:r>
               <a:rPr lang="en-US" dirty="0"/>
-              <a:t>Code Review: Who</a:t>
+              <a:t>Code Review: What</a:t>
             </a:r>
           </a:p>
         </p:txBody>
@@ -7826,7 +8209,7 @@
           <p:cNvPr id="3" name="Content Placeholder 2">
             <a:extLst>
               <a:ext uri="{FF2B5EF4-FFF2-40B4-BE49-F238E27FC236}">
-                <a16:creationId xmlns:a16="http://schemas.microsoft.com/office/drawing/2014/main" id="{50EF85FC-4C9C-E84F-B882-6FFD460A2993}"/>
+                <a16:creationId xmlns:a16="http://schemas.microsoft.com/office/drawing/2014/main" id="{56707E37-D232-8541-B440-42E1BE109664}"/>
               </a:ext>
             </a:extLst>
           </p:cNvPr>
@@ -7839,58 +8222,99 @@
         </p:nvSpPr>
         <p:spPr/>
         <p:txBody>
-          <a:bodyPr/>
-          <a:lstStyle/>
-          <a:p>
-            <a:r>
-              <a:rPr lang="en-US" dirty="0"/>
-              <a:t>The author of the code is the presenter.</a:t>
-            </a:r>
-          </a:p>
-          <a:p>
-            <a:r>
-              <a:rPr lang="en-US" dirty="0"/>
-              <a:t>An owner of the code being changed or added to</a:t>
+          <a:bodyPr>
+            <a:noAutofit/>
+          </a:bodyPr>
+          <a:lstStyle/>
+          <a:p>
+            <a:r>
+              <a:rPr lang="en-US" dirty="0"/>
+              <a:t>A code review is the process in which the author of some code is asked to explain it to their peers:</a:t>
             </a:r>
           </a:p>
           <a:p>
             <a:pPr lvl="1"/>
             <a:r>
               <a:rPr lang="en-US" dirty="0"/>
-              <a:t>May sometimes be the same person as presenter.</a:t>
-            </a:r>
-          </a:p>
-          <a:p>
-            <a:r>
-              <a:rPr lang="en-US" dirty="0"/>
-              <a:t>Someone to verify that the code meets standards.</a:t>
-            </a:r>
-          </a:p>
-          <a:p>
-            <a:r>
-              <a:rPr lang="en-US" dirty="0"/>
-              <a:t>Someone to ensure documentation is consistent.</a:t>
-            </a:r>
-          </a:p>
-          <a:p>
-            <a:r>
-              <a:rPr lang="en-US" dirty="0"/>
-              <a:t>Other people:</a:t>
+              <a:t>What purpose the code has;</a:t>
             </a:r>
           </a:p>
           <a:p>
             <a:pPr lvl="1"/>
             <a:r>
               <a:rPr lang="en-US" dirty="0"/>
-              <a:t>Interested in this code base;</a:t>
+              <a:t>How the code accomplishes this purpose;</a:t>
             </a:r>
           </a:p>
           <a:p>
             <a:pPr lvl="1"/>
             <a:r>
               <a:rPr lang="en-US" dirty="0"/>
-              <a:t>Experts in the code base.</a:t>
-            </a:r>
+              <a:t>How the author is confident of this information,</a:t>
+            </a:r>
+          </a:p>
+          <a:p>
+            <a:pPr lvl="2"/>
+            <a:r>
+              <a:rPr lang="en-US" dirty="0"/>
+              <a:t>E.g., show results of running tests.</a:t>
+            </a:r>
+          </a:p>
+          <a:p>
+            <a:r>
+              <a:rPr lang="en-US" dirty="0"/>
+              <a:t>A code review often concerns a code </a:t>
+            </a:r>
+            <a:r>
+              <a:rPr lang="en-US" i="1" dirty="0"/>
+              <a:t>change.</a:t>
+            </a:r>
+            <a:r>
+              <a:rPr lang="en-US" dirty="0"/>
+              <a:t> </a:t>
+            </a:r>
+          </a:p>
+          <a:p>
+            <a:r>
+              <a:rPr lang="en-US" dirty="0"/>
+              <a:t>A code review doesn’t assume anything is wrong.</a:t>
+            </a:r>
+          </a:p>
+          <a:p>
+            <a:r>
+              <a:rPr lang="en-US" dirty="0"/>
+              <a:t>A code review isn’t “selling” the code. </a:t>
+            </a:r>
+          </a:p>
+          <a:p>
+            <a:r>
+              <a:rPr lang="en-US" dirty="0"/>
+              <a:t>See </a:t>
+            </a:r>
+            <a:r>
+              <a:rPr lang="en-US" dirty="0">
+                <a:hlinkClick r:id="rId3"/>
+              </a:rPr>
+              <a:t>Chapter 9</a:t>
+            </a:r>
+            <a:r>
+              <a:rPr lang="en-US" dirty="0"/>
+              <a:t> in </a:t>
+            </a:r>
+            <a:r>
+              <a:rPr lang="en-US" dirty="0" err="1"/>
+              <a:t>SoftEng</a:t>
+            </a:r>
+            <a:r>
+              <a:rPr lang="en-US" dirty="0"/>
+              <a:t> @ Google</a:t>
+            </a:r>
+          </a:p>
+          <a:p>
+            <a:pPr marL="0" indent="0">
+              <a:buNone/>
+            </a:pPr>
+            <a:endParaRPr lang="en-US" dirty="0"/>
           </a:p>
         </p:txBody>
       </p:sp>
@@ -7899,7 +8323,7 @@
           <p:cNvPr id="4" name="Slide Number Placeholder 3">
             <a:extLst>
               <a:ext uri="{FF2B5EF4-FFF2-40B4-BE49-F238E27FC236}">
-                <a16:creationId xmlns:a16="http://schemas.microsoft.com/office/drawing/2014/main" id="{8A004921-FDE7-284A-B4DC-94BD74E362F5}"/>
+                <a16:creationId xmlns:a16="http://schemas.microsoft.com/office/drawing/2014/main" id="{5C5054CB-8275-4A48-86C8-1B05D6355F7F}"/>
               </a:ext>
             </a:extLst>
           </p:cNvPr>
@@ -7918,6 +8342,166 @@
             <a:fld id="{20F37917-FD3A-4669-9018-DA04BCDD3D75}" type="slidenum">
               <a:rPr lang="en-US" smtClean="0"/>
               <a:t>6</a:t>
+            </a:fld>
+            <a:endParaRPr lang="en-US"/>
+          </a:p>
+        </p:txBody>
+      </p:sp>
+    </p:spTree>
+    <p:extLst>
+      <p:ext uri="{BB962C8B-B14F-4D97-AF65-F5344CB8AC3E}">
+        <p14:creationId xmlns:p14="http://schemas.microsoft.com/office/powerpoint/2010/main" val="1897934589"/>
+      </p:ext>
+    </p:extLst>
+  </p:cSld>
+  <p:clrMapOvr>
+    <a:masterClrMapping/>
+  </p:clrMapOvr>
+</p:sld>
+</file>
+
+<file path=ppt/slides/slide7.xml><?xml version="1.0" encoding="utf-8"?>
+<p:sld xmlns:a="http://schemas.openxmlformats.org/drawingml/2006/main" xmlns:r="http://schemas.openxmlformats.org/officeDocument/2006/relationships" xmlns:p="http://schemas.openxmlformats.org/presentationml/2006/main">
+  <p:cSld>
+    <p:spTree>
+      <p:nvGrpSpPr>
+        <p:cNvPr id="1" name=""/>
+        <p:cNvGrpSpPr/>
+        <p:nvPr/>
+      </p:nvGrpSpPr>
+      <p:grpSpPr>
+        <a:xfrm>
+          <a:off x="0" y="0"/>
+          <a:ext cx="0" cy="0"/>
+          <a:chOff x="0" y="0"/>
+          <a:chExt cx="0" cy="0"/>
+        </a:xfrm>
+      </p:grpSpPr>
+      <p:sp>
+        <p:nvSpPr>
+          <p:cNvPr id="2" name="Title 1">
+            <a:extLst>
+              <a:ext uri="{FF2B5EF4-FFF2-40B4-BE49-F238E27FC236}">
+                <a16:creationId xmlns:a16="http://schemas.microsoft.com/office/drawing/2014/main" id="{3A90754E-3D30-E94B-AA03-9161C0C3F151}"/>
+              </a:ext>
+            </a:extLst>
+          </p:cNvPr>
+          <p:cNvSpPr>
+            <a:spLocks noGrp="1"/>
+          </p:cNvSpPr>
+          <p:nvPr>
+            <p:ph type="title"/>
+          </p:nvPr>
+        </p:nvSpPr>
+        <p:spPr/>
+        <p:txBody>
+          <a:bodyPr/>
+          <a:lstStyle/>
+          <a:p>
+            <a:r>
+              <a:rPr lang="en-US" dirty="0"/>
+              <a:t>Code Review: Who</a:t>
+            </a:r>
+          </a:p>
+        </p:txBody>
+      </p:sp>
+      <p:sp>
+        <p:nvSpPr>
+          <p:cNvPr id="3" name="Content Placeholder 2">
+            <a:extLst>
+              <a:ext uri="{FF2B5EF4-FFF2-40B4-BE49-F238E27FC236}">
+                <a16:creationId xmlns:a16="http://schemas.microsoft.com/office/drawing/2014/main" id="{50EF85FC-4C9C-E84F-B882-6FFD460A2993}"/>
+              </a:ext>
+            </a:extLst>
+          </p:cNvPr>
+          <p:cNvSpPr>
+            <a:spLocks noGrp="1"/>
+          </p:cNvSpPr>
+          <p:nvPr>
+            <p:ph idx="1"/>
+          </p:nvPr>
+        </p:nvSpPr>
+        <p:spPr/>
+        <p:txBody>
+          <a:bodyPr/>
+          <a:lstStyle/>
+          <a:p>
+            <a:r>
+              <a:rPr lang="en-US" dirty="0"/>
+              <a:t>The author of the code is the presenter.</a:t>
+            </a:r>
+          </a:p>
+          <a:p>
+            <a:r>
+              <a:rPr lang="en-US" dirty="0"/>
+              <a:t>An owner of the code being changed or added to</a:t>
+            </a:r>
+          </a:p>
+          <a:p>
+            <a:pPr lvl="1"/>
+            <a:r>
+              <a:rPr lang="en-US" dirty="0"/>
+              <a:t>May sometimes be the same person as presenter.</a:t>
+            </a:r>
+          </a:p>
+          <a:p>
+            <a:r>
+              <a:rPr lang="en-US" dirty="0"/>
+              <a:t>Someone to verify that the code meets standards.</a:t>
+            </a:r>
+          </a:p>
+          <a:p>
+            <a:r>
+              <a:rPr lang="en-US" dirty="0"/>
+              <a:t>Someone to ensure documentation is consistent.</a:t>
+            </a:r>
+          </a:p>
+          <a:p>
+            <a:r>
+              <a:rPr lang="en-US" dirty="0"/>
+              <a:t>Other people:</a:t>
+            </a:r>
+          </a:p>
+          <a:p>
+            <a:pPr lvl="1"/>
+            <a:r>
+              <a:rPr lang="en-US" dirty="0"/>
+              <a:t>Interested in this code base;</a:t>
+            </a:r>
+          </a:p>
+          <a:p>
+            <a:pPr lvl="1"/>
+            <a:r>
+              <a:rPr lang="en-US" dirty="0"/>
+              <a:t>Experts in the code base.</a:t>
+            </a:r>
+          </a:p>
+        </p:txBody>
+      </p:sp>
+      <p:sp>
+        <p:nvSpPr>
+          <p:cNvPr id="4" name="Slide Number Placeholder 3">
+            <a:extLst>
+              <a:ext uri="{FF2B5EF4-FFF2-40B4-BE49-F238E27FC236}">
+                <a16:creationId xmlns:a16="http://schemas.microsoft.com/office/drawing/2014/main" id="{8A004921-FDE7-284A-B4DC-94BD74E362F5}"/>
+              </a:ext>
+            </a:extLst>
+          </p:cNvPr>
+          <p:cNvSpPr>
+            <a:spLocks noGrp="1"/>
+          </p:cNvSpPr>
+          <p:nvPr>
+            <p:ph type="sldNum" sz="quarter" idx="12"/>
+          </p:nvPr>
+        </p:nvSpPr>
+        <p:spPr/>
+        <p:txBody>
+          <a:bodyPr/>
+          <a:lstStyle/>
+          <a:p>
+            <a:fld id="{20F37917-FD3A-4669-9018-DA04BCDD3D75}" type="slidenum">
+              <a:rPr lang="en-US" smtClean="0"/>
+              <a:t>7</a:t>
             </a:fld>
             <a:endParaRPr lang="en-US"/>
           </a:p>
@@ -8108,7 +8692,7 @@
 </p:sld>
 </file>
 
-<file path=ppt/slides/slide7.xml><?xml version="1.0" encoding="utf-8"?>
+<file path=ppt/slides/slide8.xml><?xml version="1.0" encoding="utf-8"?>
 <p:sld xmlns:a="http://schemas.openxmlformats.org/drawingml/2006/main" xmlns:r="http://schemas.openxmlformats.org/officeDocument/2006/relationships" xmlns:p="http://schemas.openxmlformats.org/presentationml/2006/main">
   <p:cSld>
     <p:spTree>
@@ -8176,7 +8760,7 @@
           <a:p>
             <a:fld id="{20F37917-FD3A-4669-9018-DA04BCDD3D75}" type="slidenum">
               <a:rPr lang="en-US" smtClean="0"/>
-              <a:t>7</a:t>
+              <a:t>8</a:t>
             </a:fld>
             <a:endParaRPr lang="en-US"/>
           </a:p>
@@ -8206,7 +8790,7 @@
           </a:prstGeom>
           <a:extLst>
             <a:ext uri="{C572A759-6A51-4108-AA02-DFA0A04FC94B}">
-              <ma14:wrappingTextBoxFlag xmlns:ma14="http://schemas.microsoft.com/office/mac/drawingml/2011/main" xmlns:a14="http://schemas.microsoft.com/office/drawing/2010/main" xmlns:m="http://schemas.openxmlformats.org/officeDocument/2006/math" xmlns="" val="1"/>
+              <ma14:wrappingTextBoxFlag xmlns="" xmlns:m="http://schemas.openxmlformats.org/officeDocument/2006/math" xmlns:a14="http://schemas.microsoft.com/office/drawing/2010/main" xmlns:ma14="http://schemas.microsoft.com/office/mac/drawingml/2011/main" val="1"/>
             </a:ext>
           </a:extLst>
         </p:spPr>
@@ -8414,7 +8998,7 @@
           </a:ln>
           <a:extLst>
             <a:ext uri="{C572A759-6A51-4108-AA02-DFA0A04FC94B}">
-              <ma14:wrappingTextBoxFlag xmlns:ma14="http://schemas.microsoft.com/office/mac/drawingml/2011/main" xmlns:a14="http://schemas.microsoft.com/office/drawing/2010/main" xmlns:m="http://schemas.openxmlformats.org/officeDocument/2006/math" xmlns="" val="1"/>
+              <ma14:wrappingTextBoxFlag xmlns="" xmlns:m="http://schemas.openxmlformats.org/officeDocument/2006/math" xmlns:a14="http://schemas.microsoft.com/office/drawing/2010/main" xmlns:ma14="http://schemas.microsoft.com/office/mac/drawingml/2011/main" val="1"/>
             </a:ext>
           </a:extLst>
         </p:spPr>
@@ -8501,7 +9085,7 @@
           </a:ln>
           <a:extLst>
             <a:ext uri="{C572A759-6A51-4108-AA02-DFA0A04FC94B}">
-              <ma14:wrappingTextBoxFlag xmlns:ma14="http://schemas.microsoft.com/office/mac/drawingml/2011/main" xmlns:a14="http://schemas.microsoft.com/office/drawing/2010/main" xmlns:m="http://schemas.openxmlformats.org/officeDocument/2006/math" xmlns="" val="1"/>
+              <ma14:wrappingTextBoxFlag xmlns="" xmlns:m="http://schemas.openxmlformats.org/officeDocument/2006/math" xmlns:a14="http://schemas.microsoft.com/office/drawing/2010/main" xmlns:ma14="http://schemas.microsoft.com/office/mac/drawingml/2011/main" val="1"/>
             </a:ext>
           </a:extLst>
         </p:spPr>
@@ -8526,186 +9110,6 @@
     <p:extLst>
       <p:ext uri="{BB962C8B-B14F-4D97-AF65-F5344CB8AC3E}">
         <p14:creationId xmlns:p14="http://schemas.microsoft.com/office/powerpoint/2010/main" val="3499736610"/>
-      </p:ext>
-    </p:extLst>
-  </p:cSld>
-  <p:clrMapOvr>
-    <a:masterClrMapping/>
-  </p:clrMapOvr>
-</p:sld>
-</file>
-
-<file path=ppt/slides/slide8.xml><?xml version="1.0" encoding="utf-8"?>
-<p:sld xmlns:a="http://schemas.openxmlformats.org/drawingml/2006/main" xmlns:r="http://schemas.openxmlformats.org/officeDocument/2006/relationships" xmlns:p="http://schemas.openxmlformats.org/presentationml/2006/main">
-  <p:cSld>
-    <p:spTree>
-      <p:nvGrpSpPr>
-        <p:cNvPr id="1" name=""/>
-        <p:cNvGrpSpPr/>
-        <p:nvPr/>
-      </p:nvGrpSpPr>
-      <p:grpSpPr>
-        <a:xfrm>
-          <a:off x="0" y="0"/>
-          <a:ext cx="0" cy="0"/>
-          <a:chOff x="0" y="0"/>
-          <a:chExt cx="0" cy="0"/>
-        </a:xfrm>
-      </p:grpSpPr>
-      <p:sp>
-        <p:nvSpPr>
-          <p:cNvPr id="2" name="Title 1">
-            <a:extLst>
-              <a:ext uri="{FF2B5EF4-FFF2-40B4-BE49-F238E27FC236}">
-                <a16:creationId xmlns:a16="http://schemas.microsoft.com/office/drawing/2014/main" id="{BBDB88D1-3664-8044-A88E-13EC277336A4}"/>
-              </a:ext>
-            </a:extLst>
-          </p:cNvPr>
-          <p:cNvSpPr>
-            <a:spLocks noGrp="1"/>
-          </p:cNvSpPr>
-          <p:nvPr>
-            <p:ph type="title"/>
-          </p:nvPr>
-        </p:nvSpPr>
-        <p:spPr/>
-        <p:txBody>
-          <a:bodyPr/>
-          <a:lstStyle/>
-          <a:p>
-            <a:r>
-              <a:rPr lang="en-US" dirty="0"/>
-              <a:t>Code Review: When</a:t>
-            </a:r>
-          </a:p>
-        </p:txBody>
-      </p:sp>
-      <p:sp>
-        <p:nvSpPr>
-          <p:cNvPr id="3" name="Content Placeholder 2">
-            <a:extLst>
-              <a:ext uri="{FF2B5EF4-FFF2-40B4-BE49-F238E27FC236}">
-                <a16:creationId xmlns:a16="http://schemas.microsoft.com/office/drawing/2014/main" id="{48DBBD07-D6E8-B846-BE18-FDFB4D7F4401}"/>
-              </a:ext>
-            </a:extLst>
-          </p:cNvPr>
-          <p:cNvSpPr>
-            <a:spLocks noGrp="1"/>
-          </p:cNvSpPr>
-          <p:nvPr>
-            <p:ph idx="1"/>
-          </p:nvPr>
-        </p:nvSpPr>
-        <p:spPr/>
-        <p:txBody>
-          <a:bodyPr/>
-          <a:lstStyle/>
-          <a:p>
-            <a:r>
-              <a:rPr lang="en-US" dirty="0"/>
-              <a:t>SE @ Google recommends reviews at commit:</a:t>
-            </a:r>
-          </a:p>
-          <a:p>
-            <a:pPr lvl="1"/>
-            <a:r>
-              <a:rPr lang="en-US" b="1" dirty="0"/>
-              <a:t>Every</a:t>
-            </a:r>
-            <a:r>
-              <a:rPr lang="en-US" dirty="0"/>
-              <a:t> commit must be reviewed;</a:t>
-            </a:r>
-          </a:p>
-          <a:p>
-            <a:pPr lvl="1"/>
-            <a:r>
-              <a:rPr lang="en-US" dirty="0"/>
-              <a:t>Best time to ensure code is good:</a:t>
-            </a:r>
-          </a:p>
-          <a:p>
-            <a:pPr lvl="2"/>
-            <a:r>
-              <a:rPr lang="en-US" dirty="0"/>
-              <a:t>Once code is in production, hard to justify;</a:t>
-            </a:r>
-          </a:p>
-          <a:p>
-            <a:pPr lvl="2"/>
-            <a:r>
-              <a:rPr lang="en-US" dirty="0"/>
-              <a:t>Before code is ready to use, review superfluous.</a:t>
-            </a:r>
-          </a:p>
-          <a:p>
-            <a:pPr lvl="1"/>
-            <a:r>
-              <a:rPr lang="en-US" dirty="0"/>
-              <a:t>Reviews need to be done quickly.</a:t>
-            </a:r>
-          </a:p>
-          <a:p>
-            <a:r>
-              <a:rPr lang="en-US" dirty="0"/>
-              <a:t>Code review for new developers:</a:t>
-            </a:r>
-          </a:p>
-          <a:p>
-            <a:pPr lvl="1"/>
-            <a:r>
-              <a:rPr lang="en-US" dirty="0"/>
-              <a:t>Helps them understand standards; </a:t>
-            </a:r>
-          </a:p>
-          <a:p>
-            <a:r>
-              <a:rPr lang="en-US" dirty="0"/>
-              <a:t>Code review of established code:</a:t>
-            </a:r>
-          </a:p>
-          <a:p>
-            <a:pPr lvl="1"/>
-            <a:r>
-              <a:rPr lang="en-US" dirty="0"/>
-              <a:t>Spread understanding of algorithms/techniques. </a:t>
-            </a:r>
-          </a:p>
-        </p:txBody>
-      </p:sp>
-      <p:sp>
-        <p:nvSpPr>
-          <p:cNvPr id="4" name="Slide Number Placeholder 3">
-            <a:extLst>
-              <a:ext uri="{FF2B5EF4-FFF2-40B4-BE49-F238E27FC236}">
-                <a16:creationId xmlns:a16="http://schemas.microsoft.com/office/drawing/2014/main" id="{6479F704-203A-0940-B3A0-25856772C98F}"/>
-              </a:ext>
-            </a:extLst>
-          </p:cNvPr>
-          <p:cNvSpPr>
-            <a:spLocks noGrp="1"/>
-          </p:cNvSpPr>
-          <p:nvPr>
-            <p:ph type="sldNum" sz="quarter" idx="12"/>
-          </p:nvPr>
-        </p:nvSpPr>
-        <p:spPr/>
-        <p:txBody>
-          <a:bodyPr/>
-          <a:lstStyle/>
-          <a:p>
-            <a:fld id="{20F37917-FD3A-4669-9018-DA04BCDD3D75}" type="slidenum">
-              <a:rPr lang="en-US" smtClean="0"/>
-              <a:t>8</a:t>
-            </a:fld>
-            <a:endParaRPr lang="en-US"/>
-          </a:p>
-        </p:txBody>
-      </p:sp>
-    </p:spTree>
-    <p:extLst>
-      <p:ext uri="{BB962C8B-B14F-4D97-AF65-F5344CB8AC3E}">
-        <p14:creationId xmlns:p14="http://schemas.microsoft.com/office/powerpoint/2010/main" val="3250453010"/>
       </p:ext>
     </p:extLst>
   </p:cSld>
@@ -8737,7 +9141,7 @@
           <p:cNvPr id="2" name="Title 1">
             <a:extLst>
               <a:ext uri="{FF2B5EF4-FFF2-40B4-BE49-F238E27FC236}">
-                <a16:creationId xmlns:a16="http://schemas.microsoft.com/office/drawing/2014/main" id="{13DDED77-BDAF-DF49-A50C-A32154CFC81D}"/>
+                <a16:creationId xmlns:a16="http://schemas.microsoft.com/office/drawing/2014/main" id="{BBDB88D1-3664-8044-A88E-13EC277336A4}"/>
               </a:ext>
             </a:extLst>
           </p:cNvPr>
@@ -8755,7 +9159,7 @@
           <a:p>
             <a:r>
               <a:rPr lang="en-US" dirty="0"/>
-              <a:t>Code Review: How</a:t>
+              <a:t>Code Review: When</a:t>
             </a:r>
           </a:p>
         </p:txBody>
@@ -8765,7 +9169,7 @@
           <p:cNvPr id="3" name="Content Placeholder 2">
             <a:extLst>
               <a:ext uri="{FF2B5EF4-FFF2-40B4-BE49-F238E27FC236}">
-                <a16:creationId xmlns:a16="http://schemas.microsoft.com/office/drawing/2014/main" id="{9C97AA96-EA46-EB42-B5D4-4EC75011D27A}"/>
+                <a16:creationId xmlns:a16="http://schemas.microsoft.com/office/drawing/2014/main" id="{48DBBD07-D6E8-B846-BE18-FDFB4D7F4401}"/>
               </a:ext>
             </a:extLst>
           </p:cNvPr>
@@ -8778,74 +9182,78 @@
         </p:nvSpPr>
         <p:spPr/>
         <p:txBody>
-          <a:bodyPr>
-            <a:normAutofit lnSpcReduction="10000"/>
-          </a:bodyPr>
-          <a:lstStyle/>
-          <a:p>
-            <a:r>
-              <a:rPr lang="en-US" dirty="0"/>
-              <a:t>At Google, reviewers get access to changes, explanation and all relevant test results: review is asynchronous.</a:t>
-            </a:r>
-          </a:p>
-          <a:p>
-            <a:r>
-              <a:rPr lang="en-US" dirty="0"/>
-              <a:t>Elsewhere reviews can be in person:</a:t>
+          <a:bodyPr/>
+          <a:lstStyle/>
+          <a:p>
+            <a:r>
+              <a:rPr lang="en-US" dirty="0"/>
+              <a:t>SE @ Google recommends reviews at commit:</a:t>
             </a:r>
           </a:p>
           <a:p>
             <a:pPr lvl="1"/>
             <a:r>
-              <a:rPr lang="en-US" dirty="0"/>
-              <a:t>More heavyweight, cannot be as common.</a:t>
-            </a:r>
-          </a:p>
-          <a:p>
-            <a:r>
-              <a:rPr lang="en-US" dirty="0"/>
-              <a:t>Review must be professional and impersonal:</a:t>
+              <a:rPr lang="en-US" b="1" dirty="0"/>
+              <a:t>Every</a:t>
+            </a:r>
+            <a:r>
+              <a:rPr lang="en-US" dirty="0"/>
+              <a:t> commit must be reviewed;</a:t>
             </a:r>
           </a:p>
           <a:p>
             <a:pPr lvl="1"/>
             <a:r>
               <a:rPr lang="en-US" dirty="0"/>
-              <a:t>No one is being “attacked” (or, no one </a:t>
-            </a:r>
-            <a:r>
-              <a:rPr lang="en-US" i="1" dirty="0"/>
-              <a:t>should </a:t>
-            </a:r>
-            <a:r>
-              <a:rPr lang="en-US" dirty="0"/>
-              <a:t>be).</a:t>
-            </a:r>
-          </a:p>
-          <a:p>
-            <a:r>
-              <a:rPr lang="en-US" dirty="0"/>
-              <a:t>Don’t rehash design arguments (defer to author).</a:t>
-            </a:r>
-          </a:p>
-          <a:p>
-            <a:r>
-              <a:rPr lang="en-US" dirty="0"/>
-              <a:t>All suggestions and criticisms must be addressed:</a:t>
+              <a:t>Best time to ensure code is good:</a:t>
+            </a:r>
+          </a:p>
+          <a:p>
+            <a:pPr lvl="2"/>
+            <a:r>
+              <a:rPr lang="en-US" dirty="0"/>
+              <a:t>Once code is in production, hard to justify;</a:t>
+            </a:r>
+          </a:p>
+          <a:p>
+            <a:pPr lvl="2"/>
+            <a:r>
+              <a:rPr lang="en-US" dirty="0"/>
+              <a:t>Before code is ready to use, review superfluous.</a:t>
             </a:r>
           </a:p>
           <a:p>
             <a:pPr lvl="1"/>
             <a:r>
               <a:rPr lang="en-US" dirty="0"/>
-              <a:t>At least in the negative.</a:t>
-            </a:r>
-          </a:p>
-          <a:p>
-            <a:endParaRPr lang="en-US" dirty="0"/>
-          </a:p>
-          <a:p>
-            <a:endParaRPr lang="en-US" dirty="0"/>
+              <a:t>Reviews need to be done quickly.</a:t>
+            </a:r>
+          </a:p>
+          <a:p>
+            <a:r>
+              <a:rPr lang="en-US" dirty="0"/>
+              <a:t>Code review for new developers:</a:t>
+            </a:r>
+          </a:p>
+          <a:p>
+            <a:pPr lvl="1"/>
+            <a:r>
+              <a:rPr lang="en-US" dirty="0"/>
+              <a:t>Helps them understand standards; </a:t>
+            </a:r>
+          </a:p>
+          <a:p>
+            <a:r>
+              <a:rPr lang="en-US" dirty="0"/>
+              <a:t>Code review of established code:</a:t>
+            </a:r>
+          </a:p>
+          <a:p>
+            <a:pPr lvl="1"/>
+            <a:r>
+              <a:rPr lang="en-US" dirty="0"/>
+              <a:t>Spread understanding of algorithms/techniques. </a:t>
+            </a:r>
           </a:p>
         </p:txBody>
       </p:sp>
@@ -8854,7 +9262,7 @@
           <p:cNvPr id="4" name="Slide Number Placeholder 3">
             <a:extLst>
               <a:ext uri="{FF2B5EF4-FFF2-40B4-BE49-F238E27FC236}">
-                <a16:creationId xmlns:a16="http://schemas.microsoft.com/office/drawing/2014/main" id="{77118D72-73C8-4743-9D00-CE096A77A867}"/>
+                <a16:creationId xmlns:a16="http://schemas.microsoft.com/office/drawing/2014/main" id="{6479F704-203A-0940-B3A0-25856772C98F}"/>
               </a:ext>
             </a:extLst>
           </p:cNvPr>
@@ -8881,7 +9289,7 @@
     </p:spTree>
     <p:extLst>
       <p:ext uri="{BB962C8B-B14F-4D97-AF65-F5344CB8AC3E}">
-        <p14:creationId xmlns:p14="http://schemas.microsoft.com/office/powerpoint/2010/main" val="3188636758"/>
+        <p14:creationId xmlns:p14="http://schemas.microsoft.com/office/powerpoint/2010/main" val="3250453010"/>
       </p:ext>
     </p:extLst>
   </p:cSld>

</xml_diff>

<commit_message>
7.3: reword a few slides, delete last slide
</commit_message>
<xml_diff>
--- a/Slides/Lesson 7.3 Code Reviews.pptx
+++ b/Slides/Lesson 7.3 Code Reviews.pptx
@@ -5,7 +5,7 @@
     <p:sldMasterId id="2147483648" r:id="rId1"/>
   </p:sldMasterIdLst>
   <p:notesMasterIdLst>
-    <p:notesMasterId r:id="rId20"/>
+    <p:notesMasterId r:id="rId19"/>
   </p:notesMasterIdLst>
   <p:sldIdLst>
     <p:sldId id="256" r:id="rId2"/>
@@ -25,32 +25,31 @@
     <p:sldId id="407" r:id="rId16"/>
     <p:sldId id="410" r:id="rId17"/>
     <p:sldId id="376" r:id="rId18"/>
-    <p:sldId id="298" r:id="rId19"/>
   </p:sldIdLst>
   <p:sldSz cx="12192000" cy="6858000"/>
   <p:notesSz cx="6858000" cy="9144000"/>
   <p:embeddedFontLst>
     <p:embeddedFont>
       <p:font typeface="Calibri" panose="020F0502020204030204" pitchFamily="34" charset="0"/>
-      <p:regular r:id="rId21"/>
-      <p:bold r:id="rId22"/>
-      <p:italic r:id="rId23"/>
-      <p:boldItalic r:id="rId24"/>
+      <p:regular r:id="rId20"/>
+      <p:bold r:id="rId21"/>
+      <p:italic r:id="rId22"/>
+      <p:boldItalic r:id="rId23"/>
     </p:embeddedFont>
     <p:embeddedFont>
       <p:font typeface="Chalkduster" panose="03050602040202020205" pitchFamily="66" charset="77"/>
+      <p:regular r:id="rId24"/>
+    </p:embeddedFont>
+    <p:embeddedFont>
+      <p:font typeface="Ink Free" panose="03080402000500000000" pitchFamily="66" charset="0"/>
       <p:regular r:id="rId25"/>
     </p:embeddedFont>
     <p:embeddedFont>
-      <p:font typeface="Ink Free" panose="03080402000500000000" pitchFamily="66" charset="0"/>
+      <p:font typeface="Verdana" panose="020B0604030504040204" pitchFamily="34" charset="0"/>
       <p:regular r:id="rId26"/>
-    </p:embeddedFont>
-    <p:embeddedFont>
-      <p:font typeface="Verdana" panose="020B0604030504040204" pitchFamily="34" charset="0"/>
-      <p:regular r:id="rId27"/>
-      <p:bold r:id="rId28"/>
-      <p:italic r:id="rId29"/>
-      <p:boldItalic r:id="rId30"/>
+      <p:bold r:id="rId27"/>
+      <p:italic r:id="rId28"/>
+      <p:boldItalic r:id="rId29"/>
     </p:embeddedFont>
   </p:embeddedFontLst>
   <p:defaultTextStyle>
@@ -1077,7 +1076,7 @@
           <a:bodyPr/>
           <a:lstStyle/>
           <a:p>
-            <a:endParaRPr lang="en-US"/>
+            <a:endParaRPr lang="en-US" dirty="0"/>
           </a:p>
         </p:txBody>
       </p:sp>
@@ -1192,90 +1191,6 @@
     <p:extLst>
       <p:ext uri="{BB962C8B-B14F-4D97-AF65-F5344CB8AC3E}">
         <p14:creationId xmlns:p14="http://schemas.microsoft.com/office/powerpoint/2010/main" val="329564543"/>
-      </p:ext>
-    </p:extLst>
-  </p:cSld>
-  <p:clrMapOvr>
-    <a:masterClrMapping/>
-  </p:clrMapOvr>
-</p:notes>
-</file>
-
-<file path=ppt/notesSlides/notesSlide17.xml><?xml version="1.0" encoding="utf-8"?>
-<p:notes xmlns:a="http://schemas.openxmlformats.org/drawingml/2006/main" xmlns:r="http://schemas.openxmlformats.org/officeDocument/2006/relationships" xmlns:p="http://schemas.openxmlformats.org/presentationml/2006/main">
-  <p:cSld>
-    <p:spTree>
-      <p:nvGrpSpPr>
-        <p:cNvPr id="1" name=""/>
-        <p:cNvGrpSpPr/>
-        <p:nvPr/>
-      </p:nvGrpSpPr>
-      <p:grpSpPr>
-        <a:xfrm>
-          <a:off x="0" y="0"/>
-          <a:ext cx="0" cy="0"/>
-          <a:chOff x="0" y="0"/>
-          <a:chExt cx="0" cy="0"/>
-        </a:xfrm>
-      </p:grpSpPr>
-      <p:sp>
-        <p:nvSpPr>
-          <p:cNvPr id="2" name="Slide Image Placeholder 1"/>
-          <p:cNvSpPr>
-            <a:spLocks noGrp="1" noRot="1" noChangeAspect="1"/>
-          </p:cNvSpPr>
-          <p:nvPr>
-            <p:ph type="sldImg"/>
-          </p:nvPr>
-        </p:nvSpPr>
-        <p:spPr/>
-      </p:sp>
-      <p:sp>
-        <p:nvSpPr>
-          <p:cNvPr id="3" name="Notes Placeholder 2"/>
-          <p:cNvSpPr>
-            <a:spLocks noGrp="1"/>
-          </p:cNvSpPr>
-          <p:nvPr>
-            <p:ph type="body" idx="1"/>
-          </p:nvPr>
-        </p:nvSpPr>
-        <p:spPr/>
-        <p:txBody>
-          <a:bodyPr/>
-          <a:lstStyle/>
-          <a:p>
-            <a:endParaRPr lang="en-US"/>
-          </a:p>
-        </p:txBody>
-      </p:sp>
-      <p:sp>
-        <p:nvSpPr>
-          <p:cNvPr id="4" name="Slide Number Placeholder 3"/>
-          <p:cNvSpPr>
-            <a:spLocks noGrp="1"/>
-          </p:cNvSpPr>
-          <p:nvPr>
-            <p:ph type="sldNum" sz="quarter" idx="5"/>
-          </p:nvPr>
-        </p:nvSpPr>
-        <p:spPr/>
-        <p:txBody>
-          <a:bodyPr/>
-          <a:lstStyle/>
-          <a:p>
-            <a:fld id="{07937F07-1250-4CCE-B198-1B2887014F41}" type="slidenum">
-              <a:rPr lang="en-US" smtClean="0"/>
-              <a:t>18</a:t>
-            </a:fld>
-            <a:endParaRPr lang="en-US"/>
-          </a:p>
-        </p:txBody>
-      </p:sp>
-    </p:spTree>
-    <p:extLst>
-      <p:ext uri="{BB962C8B-B14F-4D97-AF65-F5344CB8AC3E}">
-        <p14:creationId xmlns:p14="http://schemas.microsoft.com/office/powerpoint/2010/main" val="1017516810"/>
       </p:ext>
     </p:extLst>
   </p:cSld>
@@ -6992,7 +6907,7 @@
           <a:p>
             <a:r>
               <a:rPr lang="en-US" dirty="0"/>
-              <a:t>A Note on Programmer’s Ego</a:t>
+              <a:t>Code Reviews and Programmer’s Ego</a:t>
             </a:r>
           </a:p>
         </p:txBody>
@@ -7026,28 +6941,28 @@
             <a:pPr fontAlgn="auto"/>
             <a:r>
               <a:rPr lang="en-US" dirty="0"/>
-              <a:t>Someone looking over your work </a:t>
+              <a:t>Code review means someone’s looking over your work </a:t>
             </a:r>
           </a:p>
           <a:p>
             <a:pPr fontAlgn="auto"/>
             <a:r>
               <a:rPr lang="en-US" dirty="0"/>
-              <a:t>Probably some attachment to it </a:t>
+              <a:t>You might have some attachment to it</a:t>
             </a:r>
           </a:p>
           <a:p>
             <a:pPr fontAlgn="auto"/>
             <a:r>
               <a:rPr lang="en-US" dirty="0"/>
-              <a:t>Criticisms: sometimes hard not to take personally </a:t>
+              <a:t>Criticisms: sometimes hard not to take personally</a:t>
             </a:r>
           </a:p>
           <a:p>
             <a:pPr fontAlgn="auto"/>
             <a:r>
               <a:rPr lang="en-US" dirty="0"/>
-              <a:t>Acknowledge a criticism and move on </a:t>
+              <a:t>Acknowledge a criticism and move on</a:t>
             </a:r>
           </a:p>
           <a:p>
@@ -7059,11 +6974,17 @@
           <a:p>
             <a:r>
               <a:rPr lang="en-US" dirty="0"/>
-              <a:t>Author should not try to defend the work under review </a:t>
-            </a:r>
-          </a:p>
-          <a:p>
-            <a:endParaRPr lang="en-US" dirty="0"/>
+              <a:t>Remember: The review is not about </a:t>
+            </a:r>
+            <a:r>
+              <a:rPr lang="en-US" i="1" dirty="0"/>
+              <a:t>you</a:t>
+            </a:r>
+            <a:r>
+              <a:rPr lang="en-US" dirty="0"/>
+              <a:t>, the goal is to improve code</a:t>
+            </a:r>
+            <a:endParaRPr lang="en-US" i="1" dirty="0"/>
           </a:p>
         </p:txBody>
       </p:sp>
@@ -7262,135 +7183,6 @@
     <p:extLst>
       <p:ext uri="{BB962C8B-B14F-4D97-AF65-F5344CB8AC3E}">
         <p14:creationId xmlns:p14="http://schemas.microsoft.com/office/powerpoint/2010/main" val="2643922941"/>
-      </p:ext>
-    </p:extLst>
-  </p:cSld>
-  <p:clrMapOvr>
-    <a:masterClrMapping/>
-  </p:clrMapOvr>
-</p:sld>
-</file>
-
-<file path=ppt/slides/slide18.xml><?xml version="1.0" encoding="utf-8"?>
-<p:sld xmlns:a="http://schemas.openxmlformats.org/drawingml/2006/main" xmlns:r="http://schemas.openxmlformats.org/officeDocument/2006/relationships" xmlns:p="http://schemas.openxmlformats.org/presentationml/2006/main">
-  <p:cSld>
-    <p:spTree>
-      <p:nvGrpSpPr>
-        <p:cNvPr id="1" name=""/>
-        <p:cNvGrpSpPr/>
-        <p:nvPr/>
-      </p:nvGrpSpPr>
-      <p:grpSpPr>
-        <a:xfrm>
-          <a:off x="0" y="0"/>
-          <a:ext cx="0" cy="0"/>
-          <a:chOff x="0" y="0"/>
-          <a:chExt cx="0" cy="0"/>
-        </a:xfrm>
-      </p:grpSpPr>
-      <p:sp>
-        <p:nvSpPr>
-          <p:cNvPr id="2" name="Title 1">
-            <a:extLst>
-              <a:ext uri="{FF2B5EF4-FFF2-40B4-BE49-F238E27FC236}">
-                <a16:creationId xmlns:a16="http://schemas.microsoft.com/office/drawing/2014/main" id="{7EB782C9-1CF8-40AE-A725-0968E5F17117}"/>
-              </a:ext>
-            </a:extLst>
-          </p:cNvPr>
-          <p:cNvSpPr>
-            <a:spLocks noGrp="1"/>
-          </p:cNvSpPr>
-          <p:nvPr>
-            <p:ph type="title"/>
-          </p:nvPr>
-        </p:nvSpPr>
-        <p:spPr/>
-        <p:txBody>
-          <a:bodyPr/>
-          <a:lstStyle/>
-          <a:p>
-            <a:r>
-              <a:rPr lang="en-US" dirty="0"/>
-              <a:t>Looking Forward</a:t>
-            </a:r>
-            <a:r>
-              <a:rPr lang="en-US" dirty="0">
-                <a:solidFill>
-                  <a:srgbClr val="0070C0"/>
-                </a:solidFill>
-              </a:rPr>
-              <a:t>...</a:t>
-            </a:r>
-          </a:p>
-        </p:txBody>
-      </p:sp>
-      <p:sp>
-        <p:nvSpPr>
-          <p:cNvPr id="4" name="Text Placeholder 3">
-            <a:extLst>
-              <a:ext uri="{FF2B5EF4-FFF2-40B4-BE49-F238E27FC236}">
-                <a16:creationId xmlns:a16="http://schemas.microsoft.com/office/drawing/2014/main" id="{219D61F8-F8AD-4DBB-8160-3A2A2DFCA287}"/>
-              </a:ext>
-            </a:extLst>
-          </p:cNvPr>
-          <p:cNvSpPr>
-            <a:spLocks noGrp="1"/>
-          </p:cNvSpPr>
-          <p:nvPr>
-            <p:ph idx="1"/>
-          </p:nvPr>
-        </p:nvSpPr>
-        <p:spPr/>
-        <p:txBody>
-          <a:bodyPr/>
-          <a:lstStyle/>
-          <a:p>
-            <a:r>
-              <a:rPr lang="en-US" dirty="0"/>
-              <a:t>In our next lesson, we’ll discuss other approaches for ensuring software quality: Analysis and verification.</a:t>
-            </a:r>
-          </a:p>
-        </p:txBody>
-      </p:sp>
-      <p:sp>
-        <p:nvSpPr>
-          <p:cNvPr id="3" name="Slide Number Placeholder 2">
-            <a:extLst>
-              <a:ext uri="{FF2B5EF4-FFF2-40B4-BE49-F238E27FC236}">
-                <a16:creationId xmlns:a16="http://schemas.microsoft.com/office/drawing/2014/main" id="{E8071048-C09E-4AA0-A373-2A42FFDB91FE}"/>
-              </a:ext>
-            </a:extLst>
-          </p:cNvPr>
-          <p:cNvSpPr>
-            <a:spLocks noGrp="1"/>
-          </p:cNvSpPr>
-          <p:nvPr>
-            <p:ph type="sldNum" sz="quarter" idx="12"/>
-          </p:nvPr>
-        </p:nvSpPr>
-        <p:spPr/>
-        <p:txBody>
-          <a:bodyPr/>
-          <a:lstStyle/>
-          <a:p>
-            <a:pPr defTabSz="547695">
-              <a:defRPr/>
-            </a:pPr>
-            <a:fld id="{86CB4B4D-7CA3-9044-876B-883B54F8677D}" type="slidenum">
-              <a:rPr lang="en-US" smtClean="0"/>
-              <a:pPr defTabSz="547695">
-                <a:defRPr/>
-              </a:pPr>
-              <a:t>18</a:t>
-            </a:fld>
-            <a:endParaRPr lang="en-US"/>
-          </a:p>
-        </p:txBody>
-      </p:sp>
-    </p:spTree>
-    <p:extLst>
-      <p:ext uri="{BB962C8B-B14F-4D97-AF65-F5344CB8AC3E}">
-        <p14:creationId xmlns:p14="http://schemas.microsoft.com/office/powerpoint/2010/main" val="743338977"/>
       </p:ext>
     </p:extLst>
   </p:cSld>

</xml_diff>